<commit_message>
presentation powerpoint additions WIP
</commit_message>
<xml_diff>
--- a/Surveying_Phylogenetic_Forests.pptx
+++ b/Surveying_Phylogenetic_Forests.pptx
@@ -5,7 +5,7 @@
     <p:sldMasterId id="2147483721" r:id="rId1"/>
   </p:sldMasterIdLst>
   <p:notesMasterIdLst>
-    <p:notesMasterId r:id="rId21"/>
+    <p:notesMasterId r:id="rId22"/>
   </p:notesMasterIdLst>
   <p:sldIdLst>
     <p:sldId id="256" r:id="rId2"/>
@@ -22,11 +22,12 @@
     <p:sldId id="274" r:id="rId13"/>
     <p:sldId id="276" r:id="rId14"/>
     <p:sldId id="277" r:id="rId15"/>
-    <p:sldId id="263" r:id="rId16"/>
-    <p:sldId id="265" r:id="rId17"/>
-    <p:sldId id="264" r:id="rId18"/>
-    <p:sldId id="270" r:id="rId19"/>
-    <p:sldId id="259" r:id="rId20"/>
+    <p:sldId id="278" r:id="rId16"/>
+    <p:sldId id="263" r:id="rId17"/>
+    <p:sldId id="265" r:id="rId18"/>
+    <p:sldId id="264" r:id="rId19"/>
+    <p:sldId id="270" r:id="rId20"/>
+    <p:sldId id="259" r:id="rId21"/>
   </p:sldIdLst>
   <p:sldSz cx="12192000" cy="6858000"/>
   <p:notesSz cx="6858000" cy="9144000"/>
@@ -215,7 +216,7 @@
           <a:p>
             <a:fld id="{3AC54121-D6F6-4C33-B49C-E67A50D5504C}" type="datetimeFigureOut">
               <a:rPr lang="en-US" smtClean="0"/>
-              <a:t>2/11/2020</a:t>
+              <a:t>2/12/2020</a:t>
             </a:fld>
             <a:endParaRPr lang="en-US"/>
           </a:p>
@@ -1081,7 +1082,7 @@
           <a:p>
             <a:fld id="{1A6D8924-F9BB-4D73-9BF9-0F7F99802865}" type="slidenum">
               <a:rPr lang="en-US" smtClean="0"/>
-              <a:t>15</a:t>
+              <a:t>16</a:t>
             </a:fld>
             <a:endParaRPr lang="en-US"/>
           </a:p>
@@ -1168,7 +1169,7 @@
           <a:p>
             <a:fld id="{1A6D8924-F9BB-4D73-9BF9-0F7F99802865}" type="slidenum">
               <a:rPr lang="en-US" smtClean="0"/>
-              <a:t>16</a:t>
+              <a:t>17</a:t>
             </a:fld>
             <a:endParaRPr lang="en-US"/>
           </a:p>
@@ -1252,7 +1253,7 @@
           <a:p>
             <a:fld id="{1A6D8924-F9BB-4D73-9BF9-0F7F99802865}" type="slidenum">
               <a:rPr lang="en-US" smtClean="0"/>
-              <a:t>17</a:t>
+              <a:t>18</a:t>
             </a:fld>
             <a:endParaRPr lang="en-US"/>
           </a:p>
@@ -1440,7 +1441,7 @@
           <a:p>
             <a:fld id="{304E4740-B399-47BF-B5A6-2EA85B90FBD9}" type="datetimeFigureOut">
               <a:rPr lang="en-US" smtClean="0"/>
-              <a:t>2/11/2020</a:t>
+              <a:t>2/12/2020</a:t>
             </a:fld>
             <a:endParaRPr lang="en-US"/>
           </a:p>
@@ -1775,7 +1776,7 @@
           <a:p>
             <a:fld id="{304E4740-B399-47BF-B5A6-2EA85B90FBD9}" type="datetimeFigureOut">
               <a:rPr lang="en-US" smtClean="0"/>
-              <a:t>2/11/2020</a:t>
+              <a:t>2/12/2020</a:t>
             </a:fld>
             <a:endParaRPr lang="en-US"/>
           </a:p>
@@ -1955,7 +1956,7 @@
           <a:p>
             <a:fld id="{304E4740-B399-47BF-B5A6-2EA85B90FBD9}" type="datetimeFigureOut">
               <a:rPr lang="en-US" smtClean="0"/>
-              <a:t>2/11/2020</a:t>
+              <a:t>2/12/2020</a:t>
             </a:fld>
             <a:endParaRPr lang="en-US"/>
           </a:p>
@@ -2125,7 +2126,7 @@
           <a:p>
             <a:fld id="{304E4740-B399-47BF-B5A6-2EA85B90FBD9}" type="datetimeFigureOut">
               <a:rPr lang="en-US" smtClean="0"/>
-              <a:t>2/11/2020</a:t>
+              <a:t>2/12/2020</a:t>
             </a:fld>
             <a:endParaRPr lang="en-US"/>
           </a:p>
@@ -2402,7 +2403,7 @@
           <a:p>
             <a:fld id="{304E4740-B399-47BF-B5A6-2EA85B90FBD9}" type="datetimeFigureOut">
               <a:rPr lang="en-US" smtClean="0"/>
-              <a:t>2/11/2020</a:t>
+              <a:t>2/12/2020</a:t>
             </a:fld>
             <a:endParaRPr lang="en-US"/>
           </a:p>
@@ -2796,7 +2797,7 @@
           <a:p>
             <a:fld id="{304E4740-B399-47BF-B5A6-2EA85B90FBD9}" type="datetimeFigureOut">
               <a:rPr lang="en-US" smtClean="0"/>
-              <a:t>2/11/2020</a:t>
+              <a:t>2/12/2020</a:t>
             </a:fld>
             <a:endParaRPr lang="en-US"/>
           </a:p>
@@ -3273,7 +3274,7 @@
           <a:p>
             <a:fld id="{304E4740-B399-47BF-B5A6-2EA85B90FBD9}" type="datetimeFigureOut">
               <a:rPr lang="en-US" smtClean="0"/>
-              <a:t>2/11/2020</a:t>
+              <a:t>2/12/2020</a:t>
             </a:fld>
             <a:endParaRPr lang="en-US"/>
           </a:p>
@@ -3391,7 +3392,7 @@
           <a:p>
             <a:fld id="{304E4740-B399-47BF-B5A6-2EA85B90FBD9}" type="datetimeFigureOut">
               <a:rPr lang="en-US" smtClean="0"/>
-              <a:t>2/11/2020</a:t>
+              <a:t>2/12/2020</a:t>
             </a:fld>
             <a:endParaRPr lang="en-US"/>
           </a:p>
@@ -3486,7 +3487,7 @@
           <a:p>
             <a:fld id="{304E4740-B399-47BF-B5A6-2EA85B90FBD9}" type="datetimeFigureOut">
               <a:rPr lang="en-US" smtClean="0"/>
-              <a:t>2/11/2020</a:t>
+              <a:t>2/12/2020</a:t>
             </a:fld>
             <a:endParaRPr lang="en-US"/>
           </a:p>
@@ -3837,7 +3838,7 @@
           <a:p>
             <a:fld id="{304E4740-B399-47BF-B5A6-2EA85B90FBD9}" type="datetimeFigureOut">
               <a:rPr lang="en-US" smtClean="0"/>
-              <a:t>2/11/2020</a:t>
+              <a:t>2/12/2020</a:t>
             </a:fld>
             <a:endParaRPr lang="en-US"/>
           </a:p>
@@ -4225,7 +4226,7 @@
           <a:p>
             <a:fld id="{304E4740-B399-47BF-B5A6-2EA85B90FBD9}" type="datetimeFigureOut">
               <a:rPr lang="en-US" smtClean="0"/>
-              <a:t>2/11/2020</a:t>
+              <a:t>2/12/2020</a:t>
             </a:fld>
             <a:endParaRPr lang="en-US"/>
           </a:p>
@@ -4503,7 +4504,7 @@
           <a:p>
             <a:fld id="{304E4740-B399-47BF-B5A6-2EA85B90FBD9}" type="datetimeFigureOut">
               <a:rPr lang="en-US" smtClean="0"/>
-              <a:t>2/11/2020</a:t>
+              <a:t>2/12/2020</a:t>
             </a:fld>
             <a:endParaRPr lang="en-US"/>
           </a:p>
@@ -5254,12 +5255,34 @@
             </a:r>
           </a:p>
           <a:p>
+            <a:pPr lvl="1"/>
+            <a:r>
+              <a:rPr lang="en-US" dirty="0">
+                <a:solidFill>
+                  <a:srgbClr val="FF0000"/>
+                </a:solidFill>
+              </a:rPr>
+              <a:t>Bipartitions in true tree, not in T*</a:t>
+            </a:r>
+          </a:p>
+          <a:p>
             <a:r>
               <a:rPr lang="en-US" dirty="0"/>
               <a:t>False Positives</a:t>
             </a:r>
           </a:p>
           <a:p>
+            <a:pPr lvl="1"/>
+            <a:r>
+              <a:rPr lang="en-US" dirty="0">
+                <a:solidFill>
+                  <a:srgbClr val="FF0000"/>
+                </a:solidFill>
+              </a:rPr>
+              <a:t>Bipartitions in T not in true-tree</a:t>
+            </a:r>
+          </a:p>
+          <a:p>
             <a:r>
               <a:rPr lang="en-US" dirty="0"/>
               <a:t>Robinson-</a:t>
@@ -5283,6 +5306,32 @@
               </a:rPr>
               <a:t>Number of non-trivial bipartitions present in one tree but not the other</a:t>
             </a:r>
+          </a:p>
+          <a:p>
+            <a:pPr lvl="1"/>
+            <a:r>
+              <a:rPr lang="en-US" dirty="0">
+                <a:solidFill>
+                  <a:srgbClr val="FF0000"/>
+                </a:solidFill>
+              </a:rPr>
+              <a:t>FN + FP / 2n - 6</a:t>
+            </a:r>
+          </a:p>
+          <a:p>
+            <a:pPr lvl="1"/>
+            <a:endParaRPr lang="en-US" dirty="0">
+              <a:solidFill>
+                <a:srgbClr val="FF0000"/>
+              </a:solidFill>
+            </a:endParaRPr>
+          </a:p>
+          <a:p>
+            <a:endParaRPr lang="en-US" dirty="0">
+              <a:solidFill>
+                <a:srgbClr val="FF0000"/>
+              </a:solidFill>
+            </a:endParaRPr>
           </a:p>
         </p:txBody>
       </p:sp>
@@ -5365,7 +5414,44 @@
           <a:bodyPr/>
           <a:lstStyle/>
           <a:p>
-            <a:endParaRPr lang="en-US"/>
+            <a:r>
+              <a:rPr lang="en-US" dirty="0"/>
+              <a:t>Range:</a:t>
+            </a:r>
+          </a:p>
+          <a:p>
+            <a:pPr lvl="1"/>
+            <a:r>
+              <a:rPr lang="en-US" dirty="0"/>
+              <a:t>0 – Identical structures</a:t>
+            </a:r>
+          </a:p>
+          <a:p>
+            <a:pPr lvl="1"/>
+            <a:r>
+              <a:rPr lang="en-US" dirty="0"/>
+              <a:t>2n – 6 – maximally different trees</a:t>
+            </a:r>
+          </a:p>
+          <a:p>
+            <a:pPr lvl="2"/>
+            <a:r>
+              <a:rPr lang="en-US" dirty="0">
+                <a:solidFill>
+                  <a:srgbClr val="FF0000"/>
+                </a:solidFill>
+              </a:rPr>
+              <a:t>N – 3 internal edges</a:t>
+            </a:r>
+          </a:p>
+          <a:p>
+            <a:pPr marL="0" indent="0">
+              <a:buNone/>
+            </a:pPr>
+            <a:r>
+              <a:rPr lang="en-US" dirty="0"/>
+              <a:t> </a:t>
+            </a:r>
           </a:p>
         </p:txBody>
       </p:sp>
@@ -5445,13 +5531,44 @@
         </p:nvSpPr>
         <p:spPr/>
         <p:txBody>
-          <a:bodyPr/>
-          <a:lstStyle/>
-          <a:p>
-            <a:r>
-              <a:rPr lang="en-US" dirty="0"/>
-              <a:t>EXAMPLE!</a:t>
-            </a:r>
+          <a:bodyPr>
+            <a:normAutofit lnSpcReduction="10000"/>
+          </a:bodyPr>
+          <a:lstStyle/>
+          <a:p>
+            <a:r>
+              <a:rPr lang="en-US" dirty="0">
+                <a:solidFill>
+                  <a:srgbClr val="FF0000"/>
+                </a:solidFill>
+              </a:rPr>
+              <a:t>EXAMPLE! (build)</a:t>
+            </a:r>
+          </a:p>
+          <a:p>
+            <a:pPr lvl="1"/>
+            <a:r>
+              <a:rPr lang="en-US" dirty="0">
+                <a:solidFill>
+                  <a:srgbClr val="FF0000"/>
+                </a:solidFill>
+              </a:rPr>
+              <a:t>Large-tree </a:t>
+            </a:r>
+            <a:r>
+              <a:rPr lang="en-US" dirty="0">
+                <a:solidFill>
+                  <a:srgbClr val="FF0000"/>
+                </a:solidFill>
+                <a:sym typeface="Wingdings" panose="05000000000000000000" pitchFamily="2" charset="2"/>
+              </a:rPr>
+              <a:t> induced tree highlighted  induced tree refined and extracted</a:t>
+            </a:r>
+            <a:endParaRPr lang="en-US" dirty="0">
+              <a:solidFill>
+                <a:srgbClr val="FF0000"/>
+              </a:solidFill>
+            </a:endParaRPr>
           </a:p>
           <a:p>
             <a:endParaRPr lang="en-US" dirty="0"/>
@@ -5559,10 +5676,180 @@
         </p:nvSpPr>
         <p:spPr/>
         <p:txBody>
-          <a:bodyPr/>
-          <a:lstStyle/>
-          <a:p>
-            <a:endParaRPr lang="en-US"/>
+          <a:bodyPr>
+            <a:normAutofit fontScale="92500" lnSpcReduction="10000"/>
+          </a:bodyPr>
+          <a:lstStyle/>
+          <a:p>
+            <a:r>
+              <a:rPr lang="en-US" dirty="0"/>
+              <a:t>Identical trees / Total tree count</a:t>
+            </a:r>
+          </a:p>
+          <a:p>
+            <a:endParaRPr lang="en-US" dirty="0"/>
+          </a:p>
+          <a:p>
+            <a:r>
+              <a:rPr lang="en-US" dirty="0">
+                <a:solidFill>
+                  <a:srgbClr val="FF0000"/>
+                </a:solidFill>
+                <a:sym typeface="Wingdings" panose="05000000000000000000" pitchFamily="2" charset="2"/>
+              </a:rPr>
+              <a:t>Quartet compatibility – induced quartets compared to directly generated quartets</a:t>
+            </a:r>
+          </a:p>
+          <a:p>
+            <a:pPr lvl="1"/>
+            <a:r>
+              <a:rPr lang="en-US" dirty="0">
+                <a:solidFill>
+                  <a:srgbClr val="FF0000"/>
+                </a:solidFill>
+                <a:sym typeface="Wingdings" panose="05000000000000000000" pitchFamily="2" charset="2"/>
+              </a:rPr>
+              <a:t>(p. 91) St. John et al (2003) proved induced quartets from NJ more </a:t>
+            </a:r>
+            <a:r>
+              <a:rPr lang="en-US" dirty="0" err="1">
+                <a:solidFill>
+                  <a:srgbClr val="FF0000"/>
+                </a:solidFill>
+                <a:sym typeface="Wingdings" panose="05000000000000000000" pitchFamily="2" charset="2"/>
+              </a:rPr>
+              <a:t>accuarete</a:t>
+            </a:r>
+            <a:r>
+              <a:rPr lang="en-US" dirty="0">
+                <a:solidFill>
+                  <a:srgbClr val="FF0000"/>
+                </a:solidFill>
+                <a:sym typeface="Wingdings" panose="05000000000000000000" pitchFamily="2" charset="2"/>
+              </a:rPr>
+              <a:t> than directly generated Quartets from FPM</a:t>
+            </a:r>
+          </a:p>
+          <a:p>
+            <a:endParaRPr lang="en-US" dirty="0">
+              <a:solidFill>
+                <a:srgbClr val="FF0000"/>
+              </a:solidFill>
+              <a:sym typeface="Wingdings" panose="05000000000000000000" pitchFamily="2" charset="2"/>
+            </a:endParaRPr>
+          </a:p>
+          <a:p>
+            <a:r>
+              <a:rPr lang="en-US" dirty="0">
+                <a:solidFill>
+                  <a:srgbClr val="FF0000"/>
+                </a:solidFill>
+                <a:sym typeface="Wingdings" panose="05000000000000000000" pitchFamily="2" charset="2"/>
+              </a:rPr>
+              <a:t>T &amp; t</a:t>
+            </a:r>
+          </a:p>
+          <a:p>
+            <a:pPr lvl="1"/>
+            <a:r>
+              <a:rPr lang="en-US" dirty="0">
+                <a:solidFill>
+                  <a:srgbClr val="FF0000"/>
+                </a:solidFill>
+                <a:sym typeface="Wingdings" panose="05000000000000000000" pitchFamily="2" charset="2"/>
+              </a:rPr>
+              <a:t>If T|X is refinement of t ( i.e. C(T|X) contains all bipartitions of C(t) )</a:t>
+            </a:r>
+          </a:p>
+          <a:p>
+            <a:pPr lvl="2"/>
+            <a:r>
+              <a:rPr lang="en-US" dirty="0">
+                <a:solidFill>
+                  <a:srgbClr val="FF0000"/>
+                </a:solidFill>
+                <a:sym typeface="Wingdings" panose="05000000000000000000" pitchFamily="2" charset="2"/>
+              </a:rPr>
+              <a:t>NOTE: C(T|X) may have additional </a:t>
+            </a:r>
+            <a:r>
+              <a:rPr lang="en-US" dirty="0" err="1">
+                <a:solidFill>
+                  <a:srgbClr val="FF0000"/>
+                </a:solidFill>
+                <a:sym typeface="Wingdings" panose="05000000000000000000" pitchFamily="2" charset="2"/>
+              </a:rPr>
+              <a:t>bipparitions</a:t>
+            </a:r>
+            <a:r>
+              <a:rPr lang="en-US" dirty="0">
+                <a:solidFill>
+                  <a:srgbClr val="FF0000"/>
+                </a:solidFill>
+                <a:sym typeface="Wingdings" panose="05000000000000000000" pitchFamily="2" charset="2"/>
+              </a:rPr>
+              <a:t> (refinement)</a:t>
+            </a:r>
+          </a:p>
+          <a:p>
+            <a:pPr lvl="2"/>
+            <a:r>
+              <a:rPr lang="en-US" dirty="0">
+                <a:solidFill>
+                  <a:srgbClr val="FF0000"/>
+                </a:solidFill>
+                <a:sym typeface="Wingdings" panose="05000000000000000000" pitchFamily="2" charset="2"/>
+              </a:rPr>
+              <a:t>(p. 52)  For every tree (t-</a:t>
+            </a:r>
+            <a:r>
+              <a:rPr lang="en-US" dirty="0" err="1">
+                <a:solidFill>
+                  <a:srgbClr val="FF0000"/>
+                </a:solidFill>
+                <a:sym typeface="Wingdings" panose="05000000000000000000" pitchFamily="2" charset="2"/>
+              </a:rPr>
+              <a:t>i</a:t>
+            </a:r>
+            <a:r>
+              <a:rPr lang="en-US" dirty="0">
+                <a:solidFill>
+                  <a:srgbClr val="FF0000"/>
+                </a:solidFill>
+                <a:sym typeface="Wingdings" panose="05000000000000000000" pitchFamily="2" charset="2"/>
+              </a:rPr>
+              <a:t>) in tree set, sum of RF(</a:t>
+            </a:r>
+            <a:r>
+              <a:rPr lang="en-US" dirty="0" err="1">
+                <a:solidFill>
+                  <a:srgbClr val="FF0000"/>
+                </a:solidFill>
+                <a:sym typeface="Wingdings" panose="05000000000000000000" pitchFamily="2" charset="2"/>
+              </a:rPr>
+              <a:t>T|t-i</a:t>
+            </a:r>
+            <a:r>
+              <a:rPr lang="en-US" dirty="0">
+                <a:solidFill>
+                  <a:srgbClr val="FF0000"/>
+                </a:solidFill>
+                <a:sym typeface="Wingdings" panose="05000000000000000000" pitchFamily="2" charset="2"/>
+              </a:rPr>
+              <a:t>) == 0</a:t>
+            </a:r>
+          </a:p>
+          <a:p>
+            <a:pPr marL="0" indent="0">
+              <a:buNone/>
+            </a:pPr>
+            <a:endParaRPr lang="en-US" dirty="0"/>
+          </a:p>
+          <a:p>
+            <a:pPr marL="0" indent="0">
+              <a:buNone/>
+            </a:pPr>
+            <a:endParaRPr lang="en-US" dirty="0"/>
           </a:p>
         </p:txBody>
       </p:sp>
@@ -5601,7 +5888,7 @@
           <p:cNvPr id="2" name="Title 1">
             <a:extLst>
               <a:ext uri="{FF2B5EF4-FFF2-40B4-BE49-F238E27FC236}">
-                <a16:creationId xmlns:a16="http://schemas.microsoft.com/office/drawing/2014/main" id="{7C71A0DC-6AE4-4E73-BF5B-8273443BA46C}"/>
+                <a16:creationId xmlns:a16="http://schemas.microsoft.com/office/drawing/2014/main" id="{1F654729-F01B-4F9F-8EA4-A870B05B28CF}"/>
               </a:ext>
             </a:extLst>
           </p:cNvPr>
@@ -5619,7 +5906,7 @@
           <a:p>
             <a:r>
               <a:rPr lang="en-US" dirty="0"/>
-              <a:t>Results</a:t>
+              <a:t>Agreement</a:t>
             </a:r>
           </a:p>
         </p:txBody>
@@ -5629,7 +5916,7 @@
           <p:cNvPr id="3" name="Content Placeholder 2">
             <a:extLst>
               <a:ext uri="{FF2B5EF4-FFF2-40B4-BE49-F238E27FC236}">
-                <a16:creationId xmlns:a16="http://schemas.microsoft.com/office/drawing/2014/main" id="{E558FABB-F62F-4198-88B3-5DE192B19659}"/>
+                <a16:creationId xmlns:a16="http://schemas.microsoft.com/office/drawing/2014/main" id="{41842C8C-5488-46EF-86AA-79550E6AB743}"/>
               </a:ext>
             </a:extLst>
           </p:cNvPr>
@@ -5645,14 +5932,119 @@
           <a:bodyPr/>
           <a:lstStyle/>
           <a:p>
-            <a:endParaRPr lang="en-US"/>
+            <a:r>
+              <a:rPr lang="en-US" dirty="0"/>
+              <a:t>Q(T0) (intersection) Q(T)</a:t>
+            </a:r>
+          </a:p>
+          <a:p>
+            <a:pPr lvl="1"/>
+            <a:r>
+              <a:rPr lang="en-US" dirty="0">
+                <a:solidFill>
+                  <a:srgbClr val="FF0000"/>
+                </a:solidFill>
+              </a:rPr>
+              <a:t>T0 </a:t>
+            </a:r>
+            <a:r>
+              <a:rPr lang="en-US" dirty="0">
+                <a:solidFill>
+                  <a:srgbClr val="FF0000"/>
+                </a:solidFill>
+                <a:sym typeface="Wingdings" panose="05000000000000000000" pitchFamily="2" charset="2"/>
+              </a:rPr>
+              <a:t> “true tree”</a:t>
+            </a:r>
+          </a:p>
+          <a:p>
+            <a:pPr lvl="1"/>
+            <a:endParaRPr lang="en-US" dirty="0">
+              <a:solidFill>
+                <a:srgbClr val="FF0000"/>
+              </a:solidFill>
+              <a:sym typeface="Wingdings" panose="05000000000000000000" pitchFamily="2" charset="2"/>
+            </a:endParaRPr>
+          </a:p>
+          <a:p>
+            <a:r>
+              <a:rPr lang="en-US" dirty="0">
+                <a:solidFill>
+                  <a:schemeClr val="tx1"/>
+                </a:solidFill>
+                <a:sym typeface="Wingdings" panose="05000000000000000000" pitchFamily="2" charset="2"/>
+              </a:rPr>
+              <a:t>Quartet Agreement</a:t>
+            </a:r>
+          </a:p>
+          <a:p>
+            <a:pPr lvl="1"/>
+            <a:r>
+              <a:rPr lang="en-US" dirty="0">
+                <a:solidFill>
+                  <a:srgbClr val="FF0000"/>
+                </a:solidFill>
+                <a:sym typeface="Wingdings" panose="05000000000000000000" pitchFamily="2" charset="2"/>
+              </a:rPr>
+              <a:t>Agreement between directly generated quartet trees </a:t>
+            </a:r>
+          </a:p>
+          <a:p>
+            <a:r>
+              <a:rPr lang="en-US" dirty="0">
+                <a:solidFill>
+                  <a:schemeClr val="tx1"/>
+                </a:solidFill>
+                <a:sym typeface="Wingdings" panose="05000000000000000000" pitchFamily="2" charset="2"/>
+              </a:rPr>
+              <a:t>Induced Quartet Agreement</a:t>
+            </a:r>
+          </a:p>
+          <a:p>
+            <a:pPr lvl="1"/>
+            <a:r>
+              <a:rPr lang="en-US" dirty="0">
+                <a:solidFill>
+                  <a:srgbClr val="FF0000"/>
+                </a:solidFill>
+                <a:sym typeface="Wingdings" panose="05000000000000000000" pitchFamily="2" charset="2"/>
+              </a:rPr>
+              <a:t>Agreement between induced quartet trees </a:t>
+            </a:r>
+          </a:p>
+          <a:p>
+            <a:endParaRPr lang="en-US" dirty="0">
+              <a:solidFill>
+                <a:schemeClr val="tx1"/>
+              </a:solidFill>
+              <a:sym typeface="Wingdings" panose="05000000000000000000" pitchFamily="2" charset="2"/>
+            </a:endParaRPr>
+          </a:p>
+          <a:p>
+            <a:endParaRPr lang="en-US" dirty="0">
+              <a:solidFill>
+                <a:schemeClr val="tx1"/>
+              </a:solidFill>
+              <a:sym typeface="Wingdings" panose="05000000000000000000" pitchFamily="2" charset="2"/>
+            </a:endParaRPr>
+          </a:p>
+          <a:p>
+            <a:pPr marL="0" indent="0">
+              <a:buNone/>
+            </a:pPr>
+            <a:endParaRPr lang="en-US" dirty="0">
+              <a:solidFill>
+                <a:srgbClr val="FF0000"/>
+              </a:solidFill>
+              <a:sym typeface="Wingdings" panose="05000000000000000000" pitchFamily="2" charset="2"/>
+            </a:endParaRPr>
           </a:p>
         </p:txBody>
       </p:sp>
     </p:spTree>
     <p:extLst>
       <p:ext uri="{BB962C8B-B14F-4D97-AF65-F5344CB8AC3E}">
-        <p14:creationId xmlns:p14="http://schemas.microsoft.com/office/powerpoint/2010/main" val="1478176425"/>
+        <p14:creationId xmlns:p14="http://schemas.microsoft.com/office/powerpoint/2010/main" val="2890113839"/>
       </p:ext>
     </p:extLst>
   </p:cSld>
@@ -5684,7 +6076,7 @@
           <p:cNvPr id="2" name="Title 1">
             <a:extLst>
               <a:ext uri="{FF2B5EF4-FFF2-40B4-BE49-F238E27FC236}">
-                <a16:creationId xmlns:a16="http://schemas.microsoft.com/office/drawing/2014/main" id="{89778CF9-C0C2-4E5A-9498-8E5A3EFBEE1C}"/>
+                <a16:creationId xmlns:a16="http://schemas.microsoft.com/office/drawing/2014/main" id="{7C71A0DC-6AE4-4E73-BF5B-8273443BA46C}"/>
               </a:ext>
             </a:extLst>
           </p:cNvPr>
@@ -5702,7 +6094,7 @@
           <a:p>
             <a:r>
               <a:rPr lang="en-US" dirty="0"/>
-              <a:t>Timings</a:t>
+              <a:t>Results</a:t>
             </a:r>
           </a:p>
         </p:txBody>
@@ -5712,7 +6104,7 @@
           <p:cNvPr id="3" name="Content Placeholder 2">
             <a:extLst>
               <a:ext uri="{FF2B5EF4-FFF2-40B4-BE49-F238E27FC236}">
-                <a16:creationId xmlns:a16="http://schemas.microsoft.com/office/drawing/2014/main" id="{9C662559-6FC7-4036-9067-313195B78470}"/>
+                <a16:creationId xmlns:a16="http://schemas.microsoft.com/office/drawing/2014/main" id="{E558FABB-F62F-4198-88B3-5DE192B19659}"/>
               </a:ext>
             </a:extLst>
           </p:cNvPr>
@@ -5735,7 +6127,7 @@
     </p:spTree>
     <p:extLst>
       <p:ext uri="{BB962C8B-B14F-4D97-AF65-F5344CB8AC3E}">
-        <p14:creationId xmlns:p14="http://schemas.microsoft.com/office/powerpoint/2010/main" val="834576793"/>
+        <p14:creationId xmlns:p14="http://schemas.microsoft.com/office/powerpoint/2010/main" val="1478176425"/>
       </p:ext>
     </p:extLst>
   </p:cSld>
@@ -5767,7 +6159,7 @@
           <p:cNvPr id="2" name="Title 1">
             <a:extLst>
               <a:ext uri="{FF2B5EF4-FFF2-40B4-BE49-F238E27FC236}">
-                <a16:creationId xmlns:a16="http://schemas.microsoft.com/office/drawing/2014/main" id="{D03F5BF0-0AD7-4B01-BD13-01EDFD009E2E}"/>
+                <a16:creationId xmlns:a16="http://schemas.microsoft.com/office/drawing/2014/main" id="{89778CF9-C0C2-4E5A-9498-8E5A3EFBEE1C}"/>
               </a:ext>
             </a:extLst>
           </p:cNvPr>
@@ -5784,10 +6176,9 @@
           <a:lstStyle/>
           <a:p>
             <a:r>
-              <a:rPr lang="en-US" dirty="0" err="1"/>
-              <a:t>PhyloTools</a:t>
-            </a:r>
-            <a:endParaRPr lang="en-US" dirty="0"/>
+              <a:rPr lang="en-US" dirty="0"/>
+              <a:t>Timings</a:t>
+            </a:r>
           </a:p>
         </p:txBody>
       </p:sp>
@@ -5796,7 +6187,7 @@
           <p:cNvPr id="3" name="Content Placeholder 2">
             <a:extLst>
               <a:ext uri="{FF2B5EF4-FFF2-40B4-BE49-F238E27FC236}">
-                <a16:creationId xmlns:a16="http://schemas.microsoft.com/office/drawing/2014/main" id="{0967048B-71FB-4B8F-84A2-0201BFF4D0FE}"/>
+                <a16:creationId xmlns:a16="http://schemas.microsoft.com/office/drawing/2014/main" id="{9C662559-6FC7-4036-9067-313195B78470}"/>
               </a:ext>
             </a:extLst>
           </p:cNvPr>
@@ -5812,63 +6203,14 @@
           <a:bodyPr/>
           <a:lstStyle/>
           <a:p>
-            <a:r>
-              <a:rPr lang="en-US" dirty="0"/>
-              <a:t>Swiss army knife</a:t>
-            </a:r>
-          </a:p>
-          <a:p>
-            <a:pPr lvl="1"/>
-            <a:r>
-              <a:rPr lang="en-US" dirty="0"/>
-              <a:t>Input:</a:t>
-            </a:r>
-          </a:p>
-          <a:p>
-            <a:pPr lvl="2"/>
-            <a:r>
-              <a:rPr lang="en-US" dirty="0"/>
-              <a:t>FASTA sequences</a:t>
-            </a:r>
-          </a:p>
-          <a:p>
-            <a:pPr lvl="2"/>
-            <a:r>
-              <a:rPr lang="en-US" dirty="0"/>
-              <a:t>…</a:t>
-            </a:r>
-          </a:p>
-          <a:p>
-            <a:pPr lvl="1"/>
-            <a:r>
-              <a:rPr lang="en-US" dirty="0"/>
-              <a:t>Output:</a:t>
-            </a:r>
-          </a:p>
-          <a:p>
-            <a:pPr lvl="2"/>
-            <a:r>
-              <a:rPr lang="en-US" dirty="0"/>
-              <a:t>Tree analysis document</a:t>
-            </a:r>
-          </a:p>
-          <a:p>
-            <a:pPr lvl="2"/>
-            <a:r>
-              <a:rPr lang="en-US" dirty="0"/>
-              <a:t>…</a:t>
-            </a:r>
-          </a:p>
-          <a:p>
-            <a:pPr lvl="1"/>
-            <a:endParaRPr lang="en-US" dirty="0"/>
+            <a:endParaRPr lang="en-US"/>
           </a:p>
         </p:txBody>
       </p:sp>
     </p:spTree>
     <p:extLst>
       <p:ext uri="{BB962C8B-B14F-4D97-AF65-F5344CB8AC3E}">
-        <p14:creationId xmlns:p14="http://schemas.microsoft.com/office/powerpoint/2010/main" val="1581292021"/>
+        <p14:creationId xmlns:p14="http://schemas.microsoft.com/office/powerpoint/2010/main" val="834576793"/>
       </p:ext>
     </p:extLst>
   </p:cSld>
@@ -5900,6 +6242,139 @@
           <p:cNvPr id="2" name="Title 1">
             <a:extLst>
               <a:ext uri="{FF2B5EF4-FFF2-40B4-BE49-F238E27FC236}">
+                <a16:creationId xmlns:a16="http://schemas.microsoft.com/office/drawing/2014/main" id="{D03F5BF0-0AD7-4B01-BD13-01EDFD009E2E}"/>
+              </a:ext>
+            </a:extLst>
+          </p:cNvPr>
+          <p:cNvSpPr>
+            <a:spLocks noGrp="1"/>
+          </p:cNvSpPr>
+          <p:nvPr>
+            <p:ph type="title"/>
+          </p:nvPr>
+        </p:nvSpPr>
+        <p:spPr/>
+        <p:txBody>
+          <a:bodyPr/>
+          <a:lstStyle/>
+          <a:p>
+            <a:r>
+              <a:rPr lang="en-US" dirty="0" err="1"/>
+              <a:t>PhyloTools</a:t>
+            </a:r>
+            <a:endParaRPr lang="en-US" dirty="0"/>
+          </a:p>
+        </p:txBody>
+      </p:sp>
+      <p:sp>
+        <p:nvSpPr>
+          <p:cNvPr id="3" name="Content Placeholder 2">
+            <a:extLst>
+              <a:ext uri="{FF2B5EF4-FFF2-40B4-BE49-F238E27FC236}">
+                <a16:creationId xmlns:a16="http://schemas.microsoft.com/office/drawing/2014/main" id="{0967048B-71FB-4B8F-84A2-0201BFF4D0FE}"/>
+              </a:ext>
+            </a:extLst>
+          </p:cNvPr>
+          <p:cNvSpPr>
+            <a:spLocks noGrp="1"/>
+          </p:cNvSpPr>
+          <p:nvPr>
+            <p:ph idx="1"/>
+          </p:nvPr>
+        </p:nvSpPr>
+        <p:spPr/>
+        <p:txBody>
+          <a:bodyPr/>
+          <a:lstStyle/>
+          <a:p>
+            <a:r>
+              <a:rPr lang="en-US" dirty="0"/>
+              <a:t>Swiss army knife</a:t>
+            </a:r>
+          </a:p>
+          <a:p>
+            <a:pPr lvl="1"/>
+            <a:r>
+              <a:rPr lang="en-US" dirty="0"/>
+              <a:t>Input:</a:t>
+            </a:r>
+          </a:p>
+          <a:p>
+            <a:pPr lvl="2"/>
+            <a:r>
+              <a:rPr lang="en-US" dirty="0"/>
+              <a:t>FASTA sequences</a:t>
+            </a:r>
+          </a:p>
+          <a:p>
+            <a:pPr lvl="2"/>
+            <a:r>
+              <a:rPr lang="en-US" dirty="0"/>
+              <a:t>…</a:t>
+            </a:r>
+          </a:p>
+          <a:p>
+            <a:pPr lvl="1"/>
+            <a:r>
+              <a:rPr lang="en-US" dirty="0"/>
+              <a:t>Output:</a:t>
+            </a:r>
+          </a:p>
+          <a:p>
+            <a:pPr lvl="2"/>
+            <a:r>
+              <a:rPr lang="en-US" dirty="0"/>
+              <a:t>Tree analysis document</a:t>
+            </a:r>
+          </a:p>
+          <a:p>
+            <a:pPr lvl="2"/>
+            <a:r>
+              <a:rPr lang="en-US" dirty="0"/>
+              <a:t>…</a:t>
+            </a:r>
+          </a:p>
+          <a:p>
+            <a:pPr lvl="1"/>
+            <a:endParaRPr lang="en-US" dirty="0"/>
+          </a:p>
+        </p:txBody>
+      </p:sp>
+    </p:spTree>
+    <p:extLst>
+      <p:ext uri="{BB962C8B-B14F-4D97-AF65-F5344CB8AC3E}">
+        <p14:creationId xmlns:p14="http://schemas.microsoft.com/office/powerpoint/2010/main" val="1581292021"/>
+      </p:ext>
+    </p:extLst>
+  </p:cSld>
+  <p:clrMapOvr>
+    <a:masterClrMapping/>
+  </p:clrMapOvr>
+</p:sld>
+</file>
+
+<file path=ppt/slides/slide19.xml><?xml version="1.0" encoding="utf-8"?>
+<p:sld xmlns:a="http://schemas.openxmlformats.org/drawingml/2006/main" xmlns:r="http://schemas.openxmlformats.org/officeDocument/2006/relationships" xmlns:p="http://schemas.openxmlformats.org/presentationml/2006/main">
+  <p:cSld>
+    <p:spTree>
+      <p:nvGrpSpPr>
+        <p:cNvPr id="1" name=""/>
+        <p:cNvGrpSpPr/>
+        <p:nvPr/>
+      </p:nvGrpSpPr>
+      <p:grpSpPr>
+        <a:xfrm>
+          <a:off x="0" y="0"/>
+          <a:ext cx="0" cy="0"/>
+          <a:chOff x="0" y="0"/>
+          <a:chExt cx="0" cy="0"/>
+        </a:xfrm>
+      </p:grpSpPr>
+      <p:sp>
+        <p:nvSpPr>
+          <p:cNvPr id="2" name="Title 1">
+            <a:extLst>
+              <a:ext uri="{FF2B5EF4-FFF2-40B4-BE49-F238E27FC236}">
                 <a16:creationId xmlns:a16="http://schemas.microsoft.com/office/drawing/2014/main" id="{4F31E323-9959-48AA-B336-2E14EFCC13B7}"/>
               </a:ext>
             </a:extLst>
@@ -5944,7 +6419,7 @@
           <a:bodyPr/>
           <a:lstStyle/>
           <a:p>
-            <a:endParaRPr lang="en-US"/>
+            <a:endParaRPr lang="en-US" dirty="0"/>
           </a:p>
         </p:txBody>
       </p:sp>
@@ -5961,7 +6436,345 @@
 </p:sld>
 </file>
 
-<file path=ppt/slides/slide19.xml><?xml version="1.0" encoding="utf-8"?>
+<file path=ppt/slides/slide2.xml><?xml version="1.0" encoding="utf-8"?>
+<p:sld xmlns:a="http://schemas.openxmlformats.org/drawingml/2006/main" xmlns:r="http://schemas.openxmlformats.org/officeDocument/2006/relationships" xmlns:p="http://schemas.openxmlformats.org/presentationml/2006/main">
+  <p:cSld>
+    <p:bg>
+      <p:bgPr>
+        <a:solidFill>
+          <a:schemeClr val="bg1">
+            <a:tint val="95000"/>
+            <a:satMod val="170000"/>
+          </a:schemeClr>
+        </a:solidFill>
+        <a:effectLst/>
+      </p:bgPr>
+    </p:bg>
+    <p:spTree>
+      <p:nvGrpSpPr>
+        <p:cNvPr id="1" name=""/>
+        <p:cNvGrpSpPr/>
+        <p:nvPr/>
+      </p:nvGrpSpPr>
+      <p:grpSpPr>
+        <a:xfrm>
+          <a:off x="0" y="0"/>
+          <a:ext cx="0" cy="0"/>
+          <a:chOff x="0" y="0"/>
+          <a:chExt cx="0" cy="0"/>
+        </a:xfrm>
+      </p:grpSpPr>
+      <p:sp>
+        <p:nvSpPr>
+          <p:cNvPr id="2" name="Title 1">
+            <a:extLst>
+              <a:ext uri="{FF2B5EF4-FFF2-40B4-BE49-F238E27FC236}">
+                <a16:creationId xmlns:a16="http://schemas.microsoft.com/office/drawing/2014/main" id="{12F8F973-E7DE-41A2-B4B7-C9550A2C3834}"/>
+              </a:ext>
+            </a:extLst>
+          </p:cNvPr>
+          <p:cNvSpPr>
+            <a:spLocks noGrp="1"/>
+          </p:cNvSpPr>
+          <p:nvPr>
+            <p:ph type="title"/>
+          </p:nvPr>
+        </p:nvSpPr>
+        <p:spPr>
+          <a:xfrm>
+            <a:off x="4179577" y="603380"/>
+            <a:ext cx="6782338" cy="1312506"/>
+          </a:xfrm>
+        </p:spPr>
+        <p:txBody>
+          <a:bodyPr anchor="t">
+            <a:normAutofit/>
+          </a:bodyPr>
+          <a:lstStyle/>
+          <a:p>
+            <a:r>
+              <a:rPr lang="en-US" u="sng" dirty="0">
+                <a:solidFill>
+                  <a:schemeClr val="tx2"/>
+                </a:solidFill>
+              </a:rPr>
+              <a:t>Draft</a:t>
+            </a:r>
+          </a:p>
+        </p:txBody>
+      </p:sp>
+      <p:sp>
+        <p:nvSpPr>
+          <p:cNvPr id="3" name="Content Placeholder 2">
+            <a:extLst>
+              <a:ext uri="{FF2B5EF4-FFF2-40B4-BE49-F238E27FC236}">
+                <a16:creationId xmlns:a16="http://schemas.microsoft.com/office/drawing/2014/main" id="{0DDD837F-9B3E-4089-AEA6-E41063A104D8}"/>
+              </a:ext>
+            </a:extLst>
+          </p:cNvPr>
+          <p:cNvSpPr>
+            <a:spLocks noGrp="1"/>
+          </p:cNvSpPr>
+          <p:nvPr>
+            <p:ph idx="1"/>
+          </p:nvPr>
+        </p:nvSpPr>
+        <p:spPr>
+          <a:xfrm>
+            <a:off x="4179577" y="2111829"/>
+            <a:ext cx="6782338" cy="3978075"/>
+          </a:xfrm>
+        </p:spPr>
+        <p:txBody>
+          <a:bodyPr anchor="t">
+            <a:normAutofit fontScale="70000" lnSpcReduction="20000"/>
+          </a:bodyPr>
+          <a:lstStyle/>
+          <a:p>
+            <a:pPr>
+              <a:lnSpc>
+                <a:spcPct val="101000"/>
+              </a:lnSpc>
+            </a:pPr>
+            <a:r>
+              <a:rPr lang="en-US" sz="1800" dirty="0">
+                <a:solidFill>
+                  <a:schemeClr val="tx2"/>
+                </a:solidFill>
+              </a:rPr>
+              <a:t>Methods</a:t>
+            </a:r>
+          </a:p>
+          <a:p>
+            <a:pPr lvl="1">
+              <a:lnSpc>
+                <a:spcPct val="101000"/>
+              </a:lnSpc>
+            </a:pPr>
+            <a:r>
+              <a:rPr lang="en-US" dirty="0">
+                <a:solidFill>
+                  <a:schemeClr val="tx2"/>
+                </a:solidFill>
+              </a:rPr>
+              <a:t>DNA </a:t>
+            </a:r>
+            <a:r>
+              <a:rPr lang="en-US" dirty="0">
+                <a:solidFill>
+                  <a:schemeClr val="tx2"/>
+                </a:solidFill>
+                <a:sym typeface="Wingdings" panose="05000000000000000000" pitchFamily="2" charset="2"/>
+              </a:rPr>
+              <a:t> Tree</a:t>
+            </a:r>
+          </a:p>
+          <a:p>
+            <a:pPr lvl="2">
+              <a:lnSpc>
+                <a:spcPct val="101000"/>
+              </a:lnSpc>
+            </a:pPr>
+            <a:r>
+              <a:rPr lang="en-US" dirty="0" err="1"/>
+              <a:t>MrBayes</a:t>
+            </a:r>
+            <a:r>
+              <a:rPr lang="en-US" dirty="0"/>
+              <a:t> (MCMC)</a:t>
+            </a:r>
+          </a:p>
+          <a:p>
+            <a:pPr lvl="2">
+              <a:lnSpc>
+                <a:spcPct val="101000"/>
+              </a:lnSpc>
+            </a:pPr>
+            <a:r>
+              <a:rPr lang="en-US" dirty="0">
+                <a:solidFill>
+                  <a:schemeClr val="tx2"/>
+                </a:solidFill>
+              </a:rPr>
+              <a:t>NCD</a:t>
+            </a:r>
+          </a:p>
+          <a:p>
+            <a:pPr lvl="2">
+              <a:lnSpc>
+                <a:spcPct val="101000"/>
+              </a:lnSpc>
+            </a:pPr>
+            <a:r>
+              <a:rPr lang="en-US" dirty="0">
+                <a:solidFill>
+                  <a:srgbClr val="FF0000"/>
+                </a:solidFill>
+              </a:rPr>
+              <a:t>Maximum parsimony</a:t>
+            </a:r>
+          </a:p>
+          <a:p>
+            <a:pPr lvl="2">
+              <a:lnSpc>
+                <a:spcPct val="101000"/>
+              </a:lnSpc>
+            </a:pPr>
+            <a:r>
+              <a:rPr lang="en-US" dirty="0">
+                <a:solidFill>
+                  <a:srgbClr val="FF0000"/>
+                </a:solidFill>
+              </a:rPr>
+              <a:t>Maximum </a:t>
+            </a:r>
+            <a:r>
+              <a:rPr lang="en-US" dirty="0" err="1">
+                <a:solidFill>
+                  <a:srgbClr val="FF0000"/>
+                </a:solidFill>
+              </a:rPr>
+              <a:t>liklihood</a:t>
+            </a:r>
+            <a:endParaRPr lang="en-US" dirty="0">
+              <a:solidFill>
+                <a:srgbClr val="FF0000"/>
+              </a:solidFill>
+            </a:endParaRPr>
+          </a:p>
+          <a:p>
+            <a:pPr>
+              <a:lnSpc>
+                <a:spcPct val="101000"/>
+              </a:lnSpc>
+            </a:pPr>
+            <a:r>
+              <a:rPr lang="en-US" sz="1800" dirty="0">
+                <a:solidFill>
+                  <a:schemeClr val="tx2"/>
+                </a:solidFill>
+              </a:rPr>
+              <a:t>Analysis Tools</a:t>
+            </a:r>
+          </a:p>
+          <a:p>
+            <a:pPr lvl="1">
+              <a:lnSpc>
+                <a:spcPct val="101000"/>
+              </a:lnSpc>
+            </a:pPr>
+            <a:r>
+              <a:rPr lang="en-US" dirty="0">
+                <a:solidFill>
+                  <a:schemeClr val="tx2"/>
+                </a:solidFill>
+              </a:rPr>
+              <a:t>Symmetric Difference</a:t>
+            </a:r>
+          </a:p>
+          <a:p>
+            <a:pPr lvl="1">
+              <a:lnSpc>
+                <a:spcPct val="101000"/>
+              </a:lnSpc>
+            </a:pPr>
+            <a:r>
+              <a:rPr lang="en-US" dirty="0">
+                <a:solidFill>
+                  <a:schemeClr val="tx2"/>
+                </a:solidFill>
+              </a:rPr>
+              <a:t>Quartet Compatibility</a:t>
+            </a:r>
+          </a:p>
+          <a:p>
+            <a:pPr lvl="1">
+              <a:lnSpc>
+                <a:spcPct val="101000"/>
+              </a:lnSpc>
+            </a:pPr>
+            <a:r>
+              <a:rPr lang="en-US" dirty="0">
+                <a:solidFill>
+                  <a:schemeClr val="tx2"/>
+                </a:solidFill>
+              </a:rPr>
+              <a:t>Quartet Agreement</a:t>
+            </a:r>
+          </a:p>
+          <a:p>
+            <a:pPr lvl="1">
+              <a:lnSpc>
+                <a:spcPct val="101000"/>
+              </a:lnSpc>
+            </a:pPr>
+            <a:r>
+              <a:rPr lang="en-US" dirty="0">
+                <a:solidFill>
+                  <a:schemeClr val="tx2"/>
+                </a:solidFill>
+              </a:rPr>
+              <a:t>Induced Quartet Agreement</a:t>
+            </a:r>
+          </a:p>
+          <a:p>
+            <a:pPr lvl="1">
+              <a:lnSpc>
+                <a:spcPct val="101000"/>
+              </a:lnSpc>
+            </a:pPr>
+            <a:endParaRPr lang="en-US" dirty="0">
+              <a:solidFill>
+                <a:schemeClr val="tx2"/>
+              </a:solidFill>
+            </a:endParaRPr>
+          </a:p>
+          <a:p>
+            <a:pPr>
+              <a:lnSpc>
+                <a:spcPct val="101000"/>
+              </a:lnSpc>
+            </a:pPr>
+            <a:r>
+              <a:rPr lang="en-US" sz="1800" dirty="0">
+                <a:solidFill>
+                  <a:schemeClr val="tx2"/>
+                </a:solidFill>
+              </a:rPr>
+              <a:t>Timing differences</a:t>
+            </a:r>
+          </a:p>
+          <a:p>
+            <a:pPr>
+              <a:lnSpc>
+                <a:spcPct val="101000"/>
+              </a:lnSpc>
+            </a:pPr>
+            <a:r>
+              <a:rPr lang="en-US" sz="1800" dirty="0">
+                <a:solidFill>
+                  <a:schemeClr val="tx2"/>
+                </a:solidFill>
+              </a:rPr>
+              <a:t>Results</a:t>
+            </a:r>
+          </a:p>
+        </p:txBody>
+      </p:sp>
+    </p:spTree>
+    <p:extLst>
+      <p:ext uri="{BB962C8B-B14F-4D97-AF65-F5344CB8AC3E}">
+        <p14:creationId xmlns:p14="http://schemas.microsoft.com/office/powerpoint/2010/main" val="2253688014"/>
+      </p:ext>
+    </p:extLst>
+  </p:cSld>
+  <p:clrMapOvr>
+    <a:overrideClrMapping bg1="dk1" tx1="lt1" bg2="dk2" tx2="lt2" accent1="accent1" accent2="accent2" accent3="accent3" accent4="accent4" accent5="accent5" accent6="accent6" hlink="hlink" folHlink="folHlink"/>
+  </p:clrMapOvr>
+</p:sld>
+</file>
+
+<file path=ppt/slides/slide20.xml><?xml version="1.0" encoding="utf-8"?>
 <p:sld xmlns:a="http://schemas.openxmlformats.org/drawingml/2006/main" xmlns:r="http://schemas.openxmlformats.org/officeDocument/2006/relationships" xmlns:p="http://schemas.openxmlformats.org/presentationml/2006/main">
   <p:cSld>
     <p:bg>
@@ -6126,6 +6939,12 @@
             <a:r>
               <a:rPr lang="en-US" dirty="0"/>
               <a:t> citation</a:t>
+            </a:r>
+          </a:p>
+          <a:p>
+            <a:r>
+              <a:rPr lang="en-US" dirty="0"/>
+              <a:t>Dr. Rogers</a:t>
             </a:r>
           </a:p>
           <a:p>
@@ -6235,344 +7054,6 @@
   </p:cSld>
   <p:clrMapOvr>
     <a:masterClrMapping/>
-  </p:clrMapOvr>
-</p:sld>
-</file>
-
-<file path=ppt/slides/slide2.xml><?xml version="1.0" encoding="utf-8"?>
-<p:sld xmlns:a="http://schemas.openxmlformats.org/drawingml/2006/main" xmlns:r="http://schemas.openxmlformats.org/officeDocument/2006/relationships" xmlns:p="http://schemas.openxmlformats.org/presentationml/2006/main">
-  <p:cSld>
-    <p:bg>
-      <p:bgPr>
-        <a:solidFill>
-          <a:schemeClr val="bg1">
-            <a:tint val="95000"/>
-            <a:satMod val="170000"/>
-          </a:schemeClr>
-        </a:solidFill>
-        <a:effectLst/>
-      </p:bgPr>
-    </p:bg>
-    <p:spTree>
-      <p:nvGrpSpPr>
-        <p:cNvPr id="1" name=""/>
-        <p:cNvGrpSpPr/>
-        <p:nvPr/>
-      </p:nvGrpSpPr>
-      <p:grpSpPr>
-        <a:xfrm>
-          <a:off x="0" y="0"/>
-          <a:ext cx="0" cy="0"/>
-          <a:chOff x="0" y="0"/>
-          <a:chExt cx="0" cy="0"/>
-        </a:xfrm>
-      </p:grpSpPr>
-      <p:sp>
-        <p:nvSpPr>
-          <p:cNvPr id="2" name="Title 1">
-            <a:extLst>
-              <a:ext uri="{FF2B5EF4-FFF2-40B4-BE49-F238E27FC236}">
-                <a16:creationId xmlns:a16="http://schemas.microsoft.com/office/drawing/2014/main" id="{12F8F973-E7DE-41A2-B4B7-C9550A2C3834}"/>
-              </a:ext>
-            </a:extLst>
-          </p:cNvPr>
-          <p:cNvSpPr>
-            <a:spLocks noGrp="1"/>
-          </p:cNvSpPr>
-          <p:nvPr>
-            <p:ph type="title"/>
-          </p:nvPr>
-        </p:nvSpPr>
-        <p:spPr>
-          <a:xfrm>
-            <a:off x="4179577" y="603380"/>
-            <a:ext cx="6782338" cy="1312506"/>
-          </a:xfrm>
-        </p:spPr>
-        <p:txBody>
-          <a:bodyPr anchor="t">
-            <a:normAutofit/>
-          </a:bodyPr>
-          <a:lstStyle/>
-          <a:p>
-            <a:r>
-              <a:rPr lang="en-US" u="sng" dirty="0">
-                <a:solidFill>
-                  <a:schemeClr val="tx2"/>
-                </a:solidFill>
-              </a:rPr>
-              <a:t>Draft</a:t>
-            </a:r>
-          </a:p>
-        </p:txBody>
-      </p:sp>
-      <p:sp>
-        <p:nvSpPr>
-          <p:cNvPr id="3" name="Content Placeholder 2">
-            <a:extLst>
-              <a:ext uri="{FF2B5EF4-FFF2-40B4-BE49-F238E27FC236}">
-                <a16:creationId xmlns:a16="http://schemas.microsoft.com/office/drawing/2014/main" id="{0DDD837F-9B3E-4089-AEA6-E41063A104D8}"/>
-              </a:ext>
-            </a:extLst>
-          </p:cNvPr>
-          <p:cNvSpPr>
-            <a:spLocks noGrp="1"/>
-          </p:cNvSpPr>
-          <p:nvPr>
-            <p:ph idx="1"/>
-          </p:nvPr>
-        </p:nvSpPr>
-        <p:spPr>
-          <a:xfrm>
-            <a:off x="4179577" y="2111829"/>
-            <a:ext cx="6782338" cy="3978075"/>
-          </a:xfrm>
-        </p:spPr>
-        <p:txBody>
-          <a:bodyPr anchor="t">
-            <a:normAutofit fontScale="70000" lnSpcReduction="20000"/>
-          </a:bodyPr>
-          <a:lstStyle/>
-          <a:p>
-            <a:pPr>
-              <a:lnSpc>
-                <a:spcPct val="101000"/>
-              </a:lnSpc>
-            </a:pPr>
-            <a:r>
-              <a:rPr lang="en-US" sz="1800" dirty="0">
-                <a:solidFill>
-                  <a:schemeClr val="tx2"/>
-                </a:solidFill>
-              </a:rPr>
-              <a:t>Methods</a:t>
-            </a:r>
-          </a:p>
-          <a:p>
-            <a:pPr lvl="1">
-              <a:lnSpc>
-                <a:spcPct val="101000"/>
-              </a:lnSpc>
-            </a:pPr>
-            <a:r>
-              <a:rPr lang="en-US" dirty="0">
-                <a:solidFill>
-                  <a:schemeClr val="tx2"/>
-                </a:solidFill>
-              </a:rPr>
-              <a:t>DNA </a:t>
-            </a:r>
-            <a:r>
-              <a:rPr lang="en-US" dirty="0">
-                <a:solidFill>
-                  <a:schemeClr val="tx2"/>
-                </a:solidFill>
-                <a:sym typeface="Wingdings" panose="05000000000000000000" pitchFamily="2" charset="2"/>
-              </a:rPr>
-              <a:t> Tree</a:t>
-            </a:r>
-          </a:p>
-          <a:p>
-            <a:pPr lvl="2">
-              <a:lnSpc>
-                <a:spcPct val="101000"/>
-              </a:lnSpc>
-            </a:pPr>
-            <a:r>
-              <a:rPr lang="en-US" dirty="0" err="1"/>
-              <a:t>MrBayes</a:t>
-            </a:r>
-            <a:r>
-              <a:rPr lang="en-US" dirty="0"/>
-              <a:t> (MCMC)</a:t>
-            </a:r>
-          </a:p>
-          <a:p>
-            <a:pPr lvl="2">
-              <a:lnSpc>
-                <a:spcPct val="101000"/>
-              </a:lnSpc>
-            </a:pPr>
-            <a:r>
-              <a:rPr lang="en-US" dirty="0">
-                <a:solidFill>
-                  <a:schemeClr val="tx2"/>
-                </a:solidFill>
-              </a:rPr>
-              <a:t>NCD</a:t>
-            </a:r>
-          </a:p>
-          <a:p>
-            <a:pPr lvl="2">
-              <a:lnSpc>
-                <a:spcPct val="101000"/>
-              </a:lnSpc>
-            </a:pPr>
-            <a:r>
-              <a:rPr lang="en-US" dirty="0">
-                <a:solidFill>
-                  <a:srgbClr val="FF0000"/>
-                </a:solidFill>
-              </a:rPr>
-              <a:t>Maximum parsimony</a:t>
-            </a:r>
-          </a:p>
-          <a:p>
-            <a:pPr lvl="2">
-              <a:lnSpc>
-                <a:spcPct val="101000"/>
-              </a:lnSpc>
-            </a:pPr>
-            <a:r>
-              <a:rPr lang="en-US" dirty="0">
-                <a:solidFill>
-                  <a:srgbClr val="FF0000"/>
-                </a:solidFill>
-              </a:rPr>
-              <a:t>Maximum </a:t>
-            </a:r>
-            <a:r>
-              <a:rPr lang="en-US" dirty="0" err="1">
-                <a:solidFill>
-                  <a:srgbClr val="FF0000"/>
-                </a:solidFill>
-              </a:rPr>
-              <a:t>liklihood</a:t>
-            </a:r>
-            <a:endParaRPr lang="en-US" dirty="0">
-              <a:solidFill>
-                <a:srgbClr val="FF0000"/>
-              </a:solidFill>
-            </a:endParaRPr>
-          </a:p>
-          <a:p>
-            <a:pPr>
-              <a:lnSpc>
-                <a:spcPct val="101000"/>
-              </a:lnSpc>
-            </a:pPr>
-            <a:r>
-              <a:rPr lang="en-US" sz="1800" dirty="0">
-                <a:solidFill>
-                  <a:schemeClr val="tx2"/>
-                </a:solidFill>
-              </a:rPr>
-              <a:t>Analysis Tools</a:t>
-            </a:r>
-          </a:p>
-          <a:p>
-            <a:pPr lvl="1">
-              <a:lnSpc>
-                <a:spcPct val="101000"/>
-              </a:lnSpc>
-            </a:pPr>
-            <a:r>
-              <a:rPr lang="en-US" dirty="0">
-                <a:solidFill>
-                  <a:schemeClr val="tx2"/>
-                </a:solidFill>
-              </a:rPr>
-              <a:t>Symmetric Difference</a:t>
-            </a:r>
-          </a:p>
-          <a:p>
-            <a:pPr lvl="1">
-              <a:lnSpc>
-                <a:spcPct val="101000"/>
-              </a:lnSpc>
-            </a:pPr>
-            <a:r>
-              <a:rPr lang="en-US" dirty="0">
-                <a:solidFill>
-                  <a:schemeClr val="tx2"/>
-                </a:solidFill>
-              </a:rPr>
-              <a:t>Quartet Compatibility</a:t>
-            </a:r>
-          </a:p>
-          <a:p>
-            <a:pPr lvl="1">
-              <a:lnSpc>
-                <a:spcPct val="101000"/>
-              </a:lnSpc>
-            </a:pPr>
-            <a:r>
-              <a:rPr lang="en-US" dirty="0">
-                <a:solidFill>
-                  <a:schemeClr val="tx2"/>
-                </a:solidFill>
-              </a:rPr>
-              <a:t>Quartet Agreement</a:t>
-            </a:r>
-          </a:p>
-          <a:p>
-            <a:pPr lvl="1">
-              <a:lnSpc>
-                <a:spcPct val="101000"/>
-              </a:lnSpc>
-            </a:pPr>
-            <a:r>
-              <a:rPr lang="en-US" dirty="0">
-                <a:solidFill>
-                  <a:schemeClr val="tx2"/>
-                </a:solidFill>
-              </a:rPr>
-              <a:t>Induced Quartet Agreement</a:t>
-            </a:r>
-          </a:p>
-          <a:p>
-            <a:pPr lvl="1">
-              <a:lnSpc>
-                <a:spcPct val="101000"/>
-              </a:lnSpc>
-            </a:pPr>
-            <a:endParaRPr lang="en-US" dirty="0">
-              <a:solidFill>
-                <a:schemeClr val="tx2"/>
-              </a:solidFill>
-            </a:endParaRPr>
-          </a:p>
-          <a:p>
-            <a:pPr>
-              <a:lnSpc>
-                <a:spcPct val="101000"/>
-              </a:lnSpc>
-            </a:pPr>
-            <a:r>
-              <a:rPr lang="en-US" sz="1800" dirty="0">
-                <a:solidFill>
-                  <a:schemeClr val="tx2"/>
-                </a:solidFill>
-              </a:rPr>
-              <a:t>Timing differences</a:t>
-            </a:r>
-          </a:p>
-          <a:p>
-            <a:pPr>
-              <a:lnSpc>
-                <a:spcPct val="101000"/>
-              </a:lnSpc>
-            </a:pPr>
-            <a:r>
-              <a:rPr lang="en-US" sz="1800" dirty="0">
-                <a:solidFill>
-                  <a:schemeClr val="tx2"/>
-                </a:solidFill>
-              </a:rPr>
-              <a:t>Results</a:t>
-            </a:r>
-          </a:p>
-        </p:txBody>
-      </p:sp>
-    </p:spTree>
-    <p:extLst>
-      <p:ext uri="{BB962C8B-B14F-4D97-AF65-F5344CB8AC3E}">
-        <p14:creationId xmlns:p14="http://schemas.microsoft.com/office/powerpoint/2010/main" val="2253688014"/>
-      </p:ext>
-    </p:extLst>
-  </p:cSld>
-  <p:clrMapOvr>
-    <a:overrideClrMapping bg1="dk1" tx1="lt1" bg2="dk2" tx2="lt2" accent1="accent1" accent2="accent2" accent3="accent3" accent4="accent4" accent5="accent5" accent6="accent6" hlink="hlink" folHlink="folHlink"/>
   </p:clrMapOvr>
 </p:sld>
 </file>

</xml_diff>

<commit_message>
surveying phylo forest ppt updated
</commit_message>
<xml_diff>
--- a/Surveying_Phylogenetic_Forests.pptx
+++ b/Surveying_Phylogenetic_Forests.pptx
@@ -6419,7 +6419,24 @@
           <a:bodyPr/>
           <a:lstStyle/>
           <a:p>
-            <a:endParaRPr lang="en-US" dirty="0"/>
+            <a:r>
+              <a:rPr lang="en-US" dirty="0"/>
+              <a:t>Exploring compression methods</a:t>
+            </a:r>
+          </a:p>
+          <a:p>
+            <a:pPr lvl="1"/>
+            <a:r>
+              <a:rPr lang="en-US" dirty="0"/>
+              <a:t>7zip vs. WinZip</a:t>
+            </a:r>
+          </a:p>
+          <a:p>
+            <a:pPr lvl="1"/>
+            <a:r>
+              <a:rPr lang="en-US" dirty="0"/>
+              <a:t>Biological assumptions in compression (MFC)</a:t>
+            </a:r>
           </a:p>
         </p:txBody>
       </p:sp>
@@ -6626,21 +6643,8 @@
                   <a:srgbClr val="FF0000"/>
                 </a:solidFill>
               </a:rPr>
-              <a:t>Maximum </a:t>
-            </a:r>
-            <a:r>
-              <a:rPr lang="en-US" dirty="0" err="1">
-                <a:solidFill>
-                  <a:srgbClr val="FF0000"/>
-                </a:solidFill>
-              </a:rPr>
-              <a:t>liklihood</a:t>
-            </a:r>
-            <a:endParaRPr lang="en-US" dirty="0">
-              <a:solidFill>
-                <a:srgbClr val="FF0000"/>
-              </a:solidFill>
-            </a:endParaRPr>
+              <a:t>Maximum likelihood</a:t>
+            </a:r>
           </a:p>
           <a:p>
             <a:pPr>
@@ -7487,6 +7491,17 @@
             </a:r>
           </a:p>
           <a:p>
+            <a:pPr lvl="1"/>
+            <a:r>
+              <a:rPr lang="en-US" dirty="0">
+                <a:solidFill>
+                  <a:srgbClr val="FF0000"/>
+                </a:solidFill>
+              </a:rPr>
+              <a:t>costly precursor</a:t>
+            </a:r>
+          </a:p>
+          <a:p>
             <a:endParaRPr lang="en-US" dirty="0">
               <a:solidFill>
                 <a:srgbClr val="FF0000"/>
@@ -7671,6 +7686,22 @@
               </a:rPr>
               <a:t>Avoids Multiple Sequence Alignment</a:t>
             </a:r>
+          </a:p>
+          <a:p>
+            <a:pPr lvl="1"/>
+            <a:r>
+              <a:rPr lang="en-US">
+                <a:solidFill>
+                  <a:srgbClr val="FF0000"/>
+                </a:solidFill>
+              </a:rPr>
+              <a:t>Muscle timings</a:t>
+            </a:r>
+            <a:endParaRPr lang="en-US" dirty="0">
+              <a:solidFill>
+                <a:srgbClr val="FF0000"/>
+              </a:solidFill>
+            </a:endParaRPr>
           </a:p>
         </p:txBody>
       </p:sp>

</xml_diff>

<commit_message>
fastme tree create integration done + mrbayes quartet execution & tree extraction WIP
</commit_message>
<xml_diff>
--- a/Surveying_Phylogenetic_Forests.pptx
+++ b/Surveying_Phylogenetic_Forests.pptx
@@ -216,7 +216,7 @@
           <a:p>
             <a:fld id="{3AC54121-D6F6-4C33-B49C-E67A50D5504C}" type="datetimeFigureOut">
               <a:rPr lang="en-US" smtClean="0"/>
-              <a:t>2/12/2020</a:t>
+              <a:t>2/14/2020</a:t>
             </a:fld>
             <a:endParaRPr lang="en-US"/>
           </a:p>
@@ -1441,7 +1441,7 @@
           <a:p>
             <a:fld id="{304E4740-B399-47BF-B5A6-2EA85B90FBD9}" type="datetimeFigureOut">
               <a:rPr lang="en-US" smtClean="0"/>
-              <a:t>2/12/2020</a:t>
+              <a:t>2/14/2020</a:t>
             </a:fld>
             <a:endParaRPr lang="en-US"/>
           </a:p>
@@ -1776,7 +1776,7 @@
           <a:p>
             <a:fld id="{304E4740-B399-47BF-B5A6-2EA85B90FBD9}" type="datetimeFigureOut">
               <a:rPr lang="en-US" smtClean="0"/>
-              <a:t>2/12/2020</a:t>
+              <a:t>2/14/2020</a:t>
             </a:fld>
             <a:endParaRPr lang="en-US"/>
           </a:p>
@@ -1956,7 +1956,7 @@
           <a:p>
             <a:fld id="{304E4740-B399-47BF-B5A6-2EA85B90FBD9}" type="datetimeFigureOut">
               <a:rPr lang="en-US" smtClean="0"/>
-              <a:t>2/12/2020</a:t>
+              <a:t>2/14/2020</a:t>
             </a:fld>
             <a:endParaRPr lang="en-US"/>
           </a:p>
@@ -2126,7 +2126,7 @@
           <a:p>
             <a:fld id="{304E4740-B399-47BF-B5A6-2EA85B90FBD9}" type="datetimeFigureOut">
               <a:rPr lang="en-US" smtClean="0"/>
-              <a:t>2/12/2020</a:t>
+              <a:t>2/14/2020</a:t>
             </a:fld>
             <a:endParaRPr lang="en-US"/>
           </a:p>
@@ -2403,7 +2403,7 @@
           <a:p>
             <a:fld id="{304E4740-B399-47BF-B5A6-2EA85B90FBD9}" type="datetimeFigureOut">
               <a:rPr lang="en-US" smtClean="0"/>
-              <a:t>2/12/2020</a:t>
+              <a:t>2/14/2020</a:t>
             </a:fld>
             <a:endParaRPr lang="en-US"/>
           </a:p>
@@ -2797,7 +2797,7 @@
           <a:p>
             <a:fld id="{304E4740-B399-47BF-B5A6-2EA85B90FBD9}" type="datetimeFigureOut">
               <a:rPr lang="en-US" smtClean="0"/>
-              <a:t>2/12/2020</a:t>
+              <a:t>2/14/2020</a:t>
             </a:fld>
             <a:endParaRPr lang="en-US"/>
           </a:p>
@@ -3274,7 +3274,7 @@
           <a:p>
             <a:fld id="{304E4740-B399-47BF-B5A6-2EA85B90FBD9}" type="datetimeFigureOut">
               <a:rPr lang="en-US" smtClean="0"/>
-              <a:t>2/12/2020</a:t>
+              <a:t>2/14/2020</a:t>
             </a:fld>
             <a:endParaRPr lang="en-US"/>
           </a:p>
@@ -3392,7 +3392,7 @@
           <a:p>
             <a:fld id="{304E4740-B399-47BF-B5A6-2EA85B90FBD9}" type="datetimeFigureOut">
               <a:rPr lang="en-US" smtClean="0"/>
-              <a:t>2/12/2020</a:t>
+              <a:t>2/14/2020</a:t>
             </a:fld>
             <a:endParaRPr lang="en-US"/>
           </a:p>
@@ -3487,7 +3487,7 @@
           <a:p>
             <a:fld id="{304E4740-B399-47BF-B5A6-2EA85B90FBD9}" type="datetimeFigureOut">
               <a:rPr lang="en-US" smtClean="0"/>
-              <a:t>2/12/2020</a:t>
+              <a:t>2/14/2020</a:t>
             </a:fld>
             <a:endParaRPr lang="en-US"/>
           </a:p>
@@ -3838,7 +3838,7 @@
           <a:p>
             <a:fld id="{304E4740-B399-47BF-B5A6-2EA85B90FBD9}" type="datetimeFigureOut">
               <a:rPr lang="en-US" smtClean="0"/>
-              <a:t>2/12/2020</a:t>
+              <a:t>2/14/2020</a:t>
             </a:fld>
             <a:endParaRPr lang="en-US"/>
           </a:p>
@@ -4226,7 +4226,7 @@
           <a:p>
             <a:fld id="{304E4740-B399-47BF-B5A6-2EA85B90FBD9}" type="datetimeFigureOut">
               <a:rPr lang="en-US" smtClean="0"/>
-              <a:t>2/12/2020</a:t>
+              <a:t>2/14/2020</a:t>
             </a:fld>
             <a:endParaRPr lang="en-US"/>
           </a:p>
@@ -4504,7 +4504,7 @@
           <a:p>
             <a:fld id="{304E4740-B399-47BF-B5A6-2EA85B90FBD9}" type="datetimeFigureOut">
               <a:rPr lang="en-US" smtClean="0"/>
-              <a:t>2/12/2020</a:t>
+              <a:t>2/14/2020</a:t>
             </a:fld>
             <a:endParaRPr lang="en-US"/>
           </a:p>
@@ -7499,6 +7499,62 @@
                 </a:solidFill>
               </a:rPr>
               <a:t>costly precursor</a:t>
+            </a:r>
+          </a:p>
+          <a:p>
+            <a:r>
+              <a:rPr lang="en-US" dirty="0">
+                <a:solidFill>
+                  <a:schemeClr val="tx1"/>
+                </a:solidFill>
+              </a:rPr>
+              <a:t>Bells and whistles</a:t>
+            </a:r>
+          </a:p>
+          <a:p>
+            <a:pPr lvl="1"/>
+            <a:r>
+              <a:rPr lang="en-US" dirty="0">
+                <a:solidFill>
+                  <a:schemeClr val="tx1"/>
+                </a:solidFill>
+              </a:rPr>
+              <a:t>Parameters of </a:t>
+            </a:r>
+            <a:r>
+              <a:rPr lang="en-US" dirty="0" err="1">
+                <a:solidFill>
+                  <a:schemeClr val="tx1"/>
+                </a:solidFill>
+              </a:rPr>
+              <a:t>MrBayes</a:t>
+            </a:r>
+            <a:endParaRPr lang="en-US" dirty="0">
+              <a:solidFill>
+                <a:schemeClr val="tx1"/>
+              </a:solidFill>
+            </a:endParaRPr>
+          </a:p>
+          <a:p>
+            <a:pPr lvl="2"/>
+            <a:r>
+              <a:rPr lang="en-US" dirty="0">
+                <a:solidFill>
+                  <a:srgbClr val="FF0000"/>
+                </a:solidFill>
+              </a:rPr>
+              <a:t>Substitution rates</a:t>
+            </a:r>
+          </a:p>
+          <a:p>
+            <a:pPr lvl="1"/>
+            <a:r>
+              <a:rPr lang="en-US" dirty="0">
+                <a:solidFill>
+                  <a:srgbClr val="FF0000"/>
+                </a:solidFill>
+              </a:rPr>
+              <a:t>Assumptions!</a:t>
             </a:r>
           </a:p>
           <a:p>

</xml_diff>

<commit_message>
updated surveying phylo forest slides
</commit_message>
<xml_diff>
--- a/Surveying_Phylogenetic_Forests.pptx
+++ b/Surveying_Phylogenetic_Forests.pptx
@@ -5,7 +5,7 @@
     <p:sldMasterId id="2147483721" r:id="rId1"/>
   </p:sldMasterIdLst>
   <p:notesMasterIdLst>
-    <p:notesMasterId r:id="rId22"/>
+    <p:notesMasterId r:id="rId23"/>
   </p:notesMasterIdLst>
   <p:sldIdLst>
     <p:sldId id="256" r:id="rId2"/>
@@ -16,18 +16,19 @@
     <p:sldId id="266" r:id="rId7"/>
     <p:sldId id="271" r:id="rId8"/>
     <p:sldId id="269" r:id="rId9"/>
-    <p:sldId id="272" r:id="rId10"/>
-    <p:sldId id="273" r:id="rId11"/>
-    <p:sldId id="275" r:id="rId12"/>
-    <p:sldId id="274" r:id="rId13"/>
-    <p:sldId id="276" r:id="rId14"/>
-    <p:sldId id="277" r:id="rId15"/>
-    <p:sldId id="278" r:id="rId16"/>
-    <p:sldId id="263" r:id="rId17"/>
-    <p:sldId id="265" r:id="rId18"/>
-    <p:sldId id="264" r:id="rId19"/>
-    <p:sldId id="270" r:id="rId20"/>
-    <p:sldId id="259" r:id="rId21"/>
+    <p:sldId id="279" r:id="rId10"/>
+    <p:sldId id="272" r:id="rId11"/>
+    <p:sldId id="273" r:id="rId12"/>
+    <p:sldId id="275" r:id="rId13"/>
+    <p:sldId id="274" r:id="rId14"/>
+    <p:sldId id="276" r:id="rId15"/>
+    <p:sldId id="277" r:id="rId16"/>
+    <p:sldId id="278" r:id="rId17"/>
+    <p:sldId id="263" r:id="rId18"/>
+    <p:sldId id="265" r:id="rId19"/>
+    <p:sldId id="264" r:id="rId20"/>
+    <p:sldId id="270" r:id="rId21"/>
+    <p:sldId id="259" r:id="rId22"/>
   </p:sldIdLst>
   <p:sldSz cx="12192000" cy="6858000"/>
   <p:notesSz cx="6858000" cy="9144000"/>
@@ -216,7 +217,7 @@
           <a:p>
             <a:fld id="{3AC54121-D6F6-4C33-B49C-E67A50D5504C}" type="datetimeFigureOut">
               <a:rPr lang="en-US" smtClean="0"/>
-              <a:t>2/14/2020</a:t>
+              <a:t>2/25/2020</a:t>
             </a:fld>
             <a:endParaRPr lang="en-US"/>
           </a:p>
@@ -1082,7 +1083,7 @@
           <a:p>
             <a:fld id="{1A6D8924-F9BB-4D73-9BF9-0F7F99802865}" type="slidenum">
               <a:rPr lang="en-US" smtClean="0"/>
-              <a:t>16</a:t>
+              <a:t>17</a:t>
             </a:fld>
             <a:endParaRPr lang="en-US"/>
           </a:p>
@@ -1169,7 +1170,7 @@
           <a:p>
             <a:fld id="{1A6D8924-F9BB-4D73-9BF9-0F7F99802865}" type="slidenum">
               <a:rPr lang="en-US" smtClean="0"/>
-              <a:t>17</a:t>
+              <a:t>18</a:t>
             </a:fld>
             <a:endParaRPr lang="en-US"/>
           </a:p>
@@ -1253,7 +1254,7 @@
           <a:p>
             <a:fld id="{1A6D8924-F9BB-4D73-9BF9-0F7F99802865}" type="slidenum">
               <a:rPr lang="en-US" smtClean="0"/>
-              <a:t>18</a:t>
+              <a:t>19</a:t>
             </a:fld>
             <a:endParaRPr lang="en-US"/>
           </a:p>
@@ -1441,7 +1442,7 @@
           <a:p>
             <a:fld id="{304E4740-B399-47BF-B5A6-2EA85B90FBD9}" type="datetimeFigureOut">
               <a:rPr lang="en-US" smtClean="0"/>
-              <a:t>2/14/2020</a:t>
+              <a:t>2/25/2020</a:t>
             </a:fld>
             <a:endParaRPr lang="en-US"/>
           </a:p>
@@ -1776,7 +1777,7 @@
           <a:p>
             <a:fld id="{304E4740-B399-47BF-B5A6-2EA85B90FBD9}" type="datetimeFigureOut">
               <a:rPr lang="en-US" smtClean="0"/>
-              <a:t>2/14/2020</a:t>
+              <a:t>2/25/2020</a:t>
             </a:fld>
             <a:endParaRPr lang="en-US"/>
           </a:p>
@@ -1956,7 +1957,7 @@
           <a:p>
             <a:fld id="{304E4740-B399-47BF-B5A6-2EA85B90FBD9}" type="datetimeFigureOut">
               <a:rPr lang="en-US" smtClean="0"/>
-              <a:t>2/14/2020</a:t>
+              <a:t>2/25/2020</a:t>
             </a:fld>
             <a:endParaRPr lang="en-US"/>
           </a:p>
@@ -2126,7 +2127,7 @@
           <a:p>
             <a:fld id="{304E4740-B399-47BF-B5A6-2EA85B90FBD9}" type="datetimeFigureOut">
               <a:rPr lang="en-US" smtClean="0"/>
-              <a:t>2/14/2020</a:t>
+              <a:t>2/25/2020</a:t>
             </a:fld>
             <a:endParaRPr lang="en-US"/>
           </a:p>
@@ -2403,7 +2404,7 @@
           <a:p>
             <a:fld id="{304E4740-B399-47BF-B5A6-2EA85B90FBD9}" type="datetimeFigureOut">
               <a:rPr lang="en-US" smtClean="0"/>
-              <a:t>2/14/2020</a:t>
+              <a:t>2/25/2020</a:t>
             </a:fld>
             <a:endParaRPr lang="en-US"/>
           </a:p>
@@ -2797,7 +2798,7 @@
           <a:p>
             <a:fld id="{304E4740-B399-47BF-B5A6-2EA85B90FBD9}" type="datetimeFigureOut">
               <a:rPr lang="en-US" smtClean="0"/>
-              <a:t>2/14/2020</a:t>
+              <a:t>2/25/2020</a:t>
             </a:fld>
             <a:endParaRPr lang="en-US"/>
           </a:p>
@@ -3274,7 +3275,7 @@
           <a:p>
             <a:fld id="{304E4740-B399-47BF-B5A6-2EA85B90FBD9}" type="datetimeFigureOut">
               <a:rPr lang="en-US" smtClean="0"/>
-              <a:t>2/14/2020</a:t>
+              <a:t>2/25/2020</a:t>
             </a:fld>
             <a:endParaRPr lang="en-US"/>
           </a:p>
@@ -3392,7 +3393,7 @@
           <a:p>
             <a:fld id="{304E4740-B399-47BF-B5A6-2EA85B90FBD9}" type="datetimeFigureOut">
               <a:rPr lang="en-US" smtClean="0"/>
-              <a:t>2/14/2020</a:t>
+              <a:t>2/25/2020</a:t>
             </a:fld>
             <a:endParaRPr lang="en-US"/>
           </a:p>
@@ -3487,7 +3488,7 @@
           <a:p>
             <a:fld id="{304E4740-B399-47BF-B5A6-2EA85B90FBD9}" type="datetimeFigureOut">
               <a:rPr lang="en-US" smtClean="0"/>
-              <a:t>2/14/2020</a:t>
+              <a:t>2/25/2020</a:t>
             </a:fld>
             <a:endParaRPr lang="en-US"/>
           </a:p>
@@ -3838,7 +3839,7 @@
           <a:p>
             <a:fld id="{304E4740-B399-47BF-B5A6-2EA85B90FBD9}" type="datetimeFigureOut">
               <a:rPr lang="en-US" smtClean="0"/>
-              <a:t>2/14/2020</a:t>
+              <a:t>2/25/2020</a:t>
             </a:fld>
             <a:endParaRPr lang="en-US"/>
           </a:p>
@@ -4226,7 +4227,7 @@
           <a:p>
             <a:fld id="{304E4740-B399-47BF-B5A6-2EA85B90FBD9}" type="datetimeFigureOut">
               <a:rPr lang="en-US" smtClean="0"/>
-              <a:t>2/14/2020</a:t>
+              <a:t>2/25/2020</a:t>
             </a:fld>
             <a:endParaRPr lang="en-US"/>
           </a:p>
@@ -4504,7 +4505,7 @@
           <a:p>
             <a:fld id="{304E4740-B399-47BF-B5A6-2EA85B90FBD9}" type="datetimeFigureOut">
               <a:rPr lang="en-US" smtClean="0"/>
-              <a:t>2/14/2020</a:t>
+              <a:t>2/25/2020</a:t>
             </a:fld>
             <a:endParaRPr lang="en-US"/>
           </a:p>
@@ -5107,7 +5108,7 @@
           <p:cNvPr id="2" name="Title 1">
             <a:extLst>
               <a:ext uri="{FF2B5EF4-FFF2-40B4-BE49-F238E27FC236}">
-                <a16:creationId xmlns:a16="http://schemas.microsoft.com/office/drawing/2014/main" id="{3B38CDF1-777B-415A-8A63-65558373EDD2}"/>
+                <a16:creationId xmlns:a16="http://schemas.microsoft.com/office/drawing/2014/main" id="{2107398C-C9F6-4BFE-BAE5-B39B1BD7F361}"/>
               </a:ext>
             </a:extLst>
           </p:cNvPr>
@@ -5135,7 +5136,7 @@
           <p:cNvPr id="3" name="Content Placeholder 2">
             <a:extLst>
               <a:ext uri="{FF2B5EF4-FFF2-40B4-BE49-F238E27FC236}">
-                <a16:creationId xmlns:a16="http://schemas.microsoft.com/office/drawing/2014/main" id="{E3854C25-AA3B-4373-B99E-DE55FE90174D}"/>
+                <a16:creationId xmlns:a16="http://schemas.microsoft.com/office/drawing/2014/main" id="{2E61FCCF-ADB1-4D16-9FE9-A6754EAC0ACF}"/>
               </a:ext>
             </a:extLst>
           </p:cNvPr>
@@ -5152,20 +5153,12 @@
           <a:lstStyle/>
           <a:p>
             <a:r>
-              <a:rPr lang="en-US" dirty="0" err="1">
+              <a:rPr lang="en-US" dirty="0">
                 <a:solidFill>
                   <a:srgbClr val="FF0000"/>
                 </a:solidFill>
               </a:rPr>
-              <a:t>Biparted</a:t>
-            </a:r>
-            <a:r>
-              <a:rPr lang="en-US" dirty="0">
-                <a:solidFill>
-                  <a:srgbClr val="FF0000"/>
-                </a:solidFill>
-              </a:rPr>
-              <a:t> tree diagram (build – slide_2)</a:t>
+              <a:t>Tree diagram (build – slide_1)</a:t>
             </a:r>
           </a:p>
         </p:txBody>
@@ -5173,7 +5166,7 @@
     </p:spTree>
     <p:extLst>
       <p:ext uri="{BB962C8B-B14F-4D97-AF65-F5344CB8AC3E}">
-        <p14:creationId xmlns:p14="http://schemas.microsoft.com/office/powerpoint/2010/main" val="2215564459"/>
+        <p14:creationId xmlns:p14="http://schemas.microsoft.com/office/powerpoint/2010/main" val="3437789769"/>
       </p:ext>
     </p:extLst>
   </p:cSld>
@@ -5205,7 +5198,7 @@
           <p:cNvPr id="2" name="Title 1">
             <a:extLst>
               <a:ext uri="{FF2B5EF4-FFF2-40B4-BE49-F238E27FC236}">
-                <a16:creationId xmlns:a16="http://schemas.microsoft.com/office/drawing/2014/main" id="{E52AC21D-BCB2-4F1B-AC0C-618152ABC0CF}"/>
+                <a16:creationId xmlns:a16="http://schemas.microsoft.com/office/drawing/2014/main" id="{3B38CDF1-777B-415A-8A63-65558373EDD2}"/>
               </a:ext>
             </a:extLst>
           </p:cNvPr>
@@ -5223,7 +5216,7 @@
           <a:p>
             <a:r>
               <a:rPr lang="en-US" dirty="0"/>
-              <a:t>Phylogeny Estimation: Quantifying Error</a:t>
+              <a:t>Bipartition</a:t>
             </a:r>
           </a:p>
         </p:txBody>
@@ -5233,7 +5226,7 @@
           <p:cNvPr id="3" name="Content Placeholder 2">
             <a:extLst>
               <a:ext uri="{FF2B5EF4-FFF2-40B4-BE49-F238E27FC236}">
-                <a16:creationId xmlns:a16="http://schemas.microsoft.com/office/drawing/2014/main" id="{12ECD62E-214D-4312-BD79-4B10F3E0423B}"/>
+                <a16:creationId xmlns:a16="http://schemas.microsoft.com/office/drawing/2014/main" id="{E3854C25-AA3B-4373-B99E-DE55FE90174D}"/>
               </a:ext>
             </a:extLst>
           </p:cNvPr>
@@ -5250,95 +5243,28 @@
           <a:lstStyle/>
           <a:p>
             <a:r>
-              <a:rPr lang="en-US" dirty="0"/>
-              <a:t>False Negatives</a:t>
-            </a:r>
-          </a:p>
-          <a:p>
-            <a:pPr lvl="1"/>
+              <a:rPr lang="en-US" dirty="0" err="1">
+                <a:solidFill>
+                  <a:srgbClr val="FF0000"/>
+                </a:solidFill>
+              </a:rPr>
+              <a:t>Biparted</a:t>
+            </a:r>
             <a:r>
               <a:rPr lang="en-US" dirty="0">
                 <a:solidFill>
                   <a:srgbClr val="FF0000"/>
                 </a:solidFill>
               </a:rPr>
-              <a:t>Bipartitions in true tree, not in T*</a:t>
-            </a:r>
-          </a:p>
-          <a:p>
-            <a:r>
-              <a:rPr lang="en-US" dirty="0"/>
-              <a:t>False Positives</a:t>
-            </a:r>
-          </a:p>
-          <a:p>
-            <a:pPr lvl="1"/>
-            <a:r>
-              <a:rPr lang="en-US" dirty="0">
-                <a:solidFill>
-                  <a:srgbClr val="FF0000"/>
-                </a:solidFill>
-              </a:rPr>
-              <a:t>Bipartitions in T not in true-tree</a:t>
-            </a:r>
-          </a:p>
-          <a:p>
-            <a:r>
-              <a:rPr lang="en-US" dirty="0"/>
-              <a:t>Robinson-</a:t>
-            </a:r>
-            <a:r>
-              <a:rPr lang="en-US" dirty="0" err="1"/>
-              <a:t>Foulds</a:t>
-            </a:r>
-            <a:r>
-              <a:rPr lang="en-US" dirty="0"/>
-              <a:t> (RF) Distance</a:t>
-            </a:r>
-          </a:p>
-          <a:p>
-            <a:pPr lvl="1"/>
-            <a:r>
-              <a:rPr lang="en-US" dirty="0">
-                <a:solidFill>
-                  <a:srgbClr val="FF0000"/>
-                </a:solidFill>
-              </a:rPr>
-              <a:t>Number of non-trivial bipartitions present in one tree but not the other</a:t>
-            </a:r>
-          </a:p>
-          <a:p>
-            <a:pPr lvl="1"/>
-            <a:r>
-              <a:rPr lang="en-US" dirty="0">
-                <a:solidFill>
-                  <a:srgbClr val="FF0000"/>
-                </a:solidFill>
-              </a:rPr>
-              <a:t>FN + FP / 2n - 6</a:t>
-            </a:r>
-          </a:p>
-          <a:p>
-            <a:pPr lvl="1"/>
-            <a:endParaRPr lang="en-US" dirty="0">
-              <a:solidFill>
-                <a:srgbClr val="FF0000"/>
-              </a:solidFill>
-            </a:endParaRPr>
-          </a:p>
-          <a:p>
-            <a:endParaRPr lang="en-US" dirty="0">
-              <a:solidFill>
-                <a:srgbClr val="FF0000"/>
-              </a:solidFill>
-            </a:endParaRPr>
+              <a:t> tree diagram (build – slide_2)</a:t>
+            </a:r>
           </a:p>
         </p:txBody>
       </p:sp>
     </p:spTree>
     <p:extLst>
       <p:ext uri="{BB962C8B-B14F-4D97-AF65-F5344CB8AC3E}">
-        <p14:creationId xmlns:p14="http://schemas.microsoft.com/office/powerpoint/2010/main" val="862714329"/>
+        <p14:creationId xmlns:p14="http://schemas.microsoft.com/office/powerpoint/2010/main" val="2215564459"/>
       </p:ext>
     </p:extLst>
   </p:cSld>
@@ -5370,7 +5296,7 @@
           <p:cNvPr id="2" name="Title 1">
             <a:extLst>
               <a:ext uri="{FF2B5EF4-FFF2-40B4-BE49-F238E27FC236}">
-                <a16:creationId xmlns:a16="http://schemas.microsoft.com/office/drawing/2014/main" id="{E0A4890A-D855-4A36-A6AB-D93272C23400}"/>
+                <a16:creationId xmlns:a16="http://schemas.microsoft.com/office/drawing/2014/main" id="{E52AC21D-BCB2-4F1B-AC0C-618152ABC0CF}"/>
               </a:ext>
             </a:extLst>
           </p:cNvPr>
@@ -5388,7 +5314,7 @@
           <a:p>
             <a:r>
               <a:rPr lang="en-US" dirty="0"/>
-              <a:t>Symmetric Difference</a:t>
+              <a:t>Phylogeny Estimation: Quantifying Error</a:t>
             </a:r>
           </a:p>
         </p:txBody>
@@ -5398,7 +5324,7 @@
           <p:cNvPr id="3" name="Content Placeholder 2">
             <a:extLst>
               <a:ext uri="{FF2B5EF4-FFF2-40B4-BE49-F238E27FC236}">
-                <a16:creationId xmlns:a16="http://schemas.microsoft.com/office/drawing/2014/main" id="{8444557C-6CB3-4AB7-9F18-4678258D8DDD}"/>
+                <a16:creationId xmlns:a16="http://schemas.microsoft.com/office/drawing/2014/main" id="{12ECD62E-214D-4312-BD79-4B10F3E0423B}"/>
               </a:ext>
             </a:extLst>
           </p:cNvPr>
@@ -5416,49 +5342,94 @@
           <a:p>
             <a:r>
               <a:rPr lang="en-US" dirty="0"/>
-              <a:t>Range:</a:t>
+              <a:t>False Negatives</a:t>
             </a:r>
           </a:p>
           <a:p>
             <a:pPr lvl="1"/>
             <a:r>
+              <a:rPr lang="en-US" dirty="0">
+                <a:solidFill>
+                  <a:srgbClr val="FF0000"/>
+                </a:solidFill>
+              </a:rPr>
+              <a:t>Bipartitions in true tree, not in T*</a:t>
+            </a:r>
+          </a:p>
+          <a:p>
+            <a:r>
               <a:rPr lang="en-US" dirty="0"/>
-              <a:t>0 – Identical structures</a:t>
+              <a:t>False Positives</a:t>
             </a:r>
           </a:p>
           <a:p>
             <a:pPr lvl="1"/>
             <a:r>
+              <a:rPr lang="en-US" dirty="0">
+                <a:solidFill>
+                  <a:srgbClr val="FF0000"/>
+                </a:solidFill>
+              </a:rPr>
+              <a:t>Bipartitions in T not in true-tree</a:t>
+            </a:r>
+          </a:p>
+          <a:p>
+            <a:r>
               <a:rPr lang="en-US" dirty="0"/>
-              <a:t>2n – 6 – maximally different trees</a:t>
-            </a:r>
-          </a:p>
-          <a:p>
-            <a:pPr lvl="2"/>
+              <a:t>Robinson-</a:t>
+            </a:r>
+            <a:r>
+              <a:rPr lang="en-US" dirty="0" err="1"/>
+              <a:t>Foulds</a:t>
+            </a:r>
+            <a:r>
+              <a:rPr lang="en-US" dirty="0"/>
+              <a:t> (RF) Distance</a:t>
+            </a:r>
+          </a:p>
+          <a:p>
+            <a:pPr lvl="1"/>
             <a:r>
               <a:rPr lang="en-US" dirty="0">
                 <a:solidFill>
                   <a:srgbClr val="FF0000"/>
                 </a:solidFill>
               </a:rPr>
-              <a:t>N – 3 internal edges</a:t>
-            </a:r>
-          </a:p>
-          <a:p>
-            <a:pPr marL="0" indent="0">
-              <a:buNone/>
-            </a:pPr>
-            <a:r>
-              <a:rPr lang="en-US" dirty="0"/>
-              <a:t> </a:t>
-            </a:r>
+              <a:t>Number of non-trivial bipartitions present in one tree but not the other</a:t>
+            </a:r>
+          </a:p>
+          <a:p>
+            <a:pPr lvl="1"/>
+            <a:r>
+              <a:rPr lang="en-US" dirty="0">
+                <a:solidFill>
+                  <a:srgbClr val="FF0000"/>
+                </a:solidFill>
+              </a:rPr>
+              <a:t>FN + FP / 2n - 6</a:t>
+            </a:r>
+          </a:p>
+          <a:p>
+            <a:pPr lvl="1"/>
+            <a:endParaRPr lang="en-US" dirty="0">
+              <a:solidFill>
+                <a:srgbClr val="FF0000"/>
+              </a:solidFill>
+            </a:endParaRPr>
+          </a:p>
+          <a:p>
+            <a:endParaRPr lang="en-US" dirty="0">
+              <a:solidFill>
+                <a:srgbClr val="FF0000"/>
+              </a:solidFill>
+            </a:endParaRPr>
           </a:p>
         </p:txBody>
       </p:sp>
     </p:spTree>
     <p:extLst>
       <p:ext uri="{BB962C8B-B14F-4D97-AF65-F5344CB8AC3E}">
-        <p14:creationId xmlns:p14="http://schemas.microsoft.com/office/powerpoint/2010/main" val="3323507255"/>
+        <p14:creationId xmlns:p14="http://schemas.microsoft.com/office/powerpoint/2010/main" val="862714329"/>
       </p:ext>
     </p:extLst>
   </p:cSld>
@@ -5490,7 +5461,7 @@
           <p:cNvPr id="2" name="Title 1">
             <a:extLst>
               <a:ext uri="{FF2B5EF4-FFF2-40B4-BE49-F238E27FC236}">
-                <a16:creationId xmlns:a16="http://schemas.microsoft.com/office/drawing/2014/main" id="{04A1F292-AFDD-4FB5-A3BC-97CA483E0F6C}"/>
+                <a16:creationId xmlns:a16="http://schemas.microsoft.com/office/drawing/2014/main" id="{E0A4890A-D855-4A36-A6AB-D93272C23400}"/>
               </a:ext>
             </a:extLst>
           </p:cNvPr>
@@ -5508,7 +5479,7 @@
           <a:p>
             <a:r>
               <a:rPr lang="en-US" dirty="0"/>
-              <a:t>Homeomorphic Subtrees</a:t>
+              <a:t>Symmetric Difference</a:t>
             </a:r>
           </a:p>
         </p:txBody>
@@ -5518,7 +5489,7 @@
           <p:cNvPr id="3" name="Content Placeholder 2">
             <a:extLst>
               <a:ext uri="{FF2B5EF4-FFF2-40B4-BE49-F238E27FC236}">
-                <a16:creationId xmlns:a16="http://schemas.microsoft.com/office/drawing/2014/main" id="{22436093-9924-4B60-8213-D05CA4A64296}"/>
+                <a16:creationId xmlns:a16="http://schemas.microsoft.com/office/drawing/2014/main" id="{8444557C-6CB3-4AB7-9F18-4678258D8DDD}"/>
               </a:ext>
             </a:extLst>
           </p:cNvPr>
@@ -5529,40 +5500,65 @@
             <p:ph idx="1"/>
           </p:nvPr>
         </p:nvSpPr>
-        <p:spPr/>
-        <p:txBody>
-          <a:bodyPr>
-            <a:normAutofit lnSpcReduction="10000"/>
-          </a:bodyPr>
-          <a:lstStyle/>
-          <a:p>
+        <p:spPr>
+          <a:xfrm>
+            <a:off x="1371600" y="2286000"/>
+            <a:ext cx="9601200" cy="3581400"/>
+          </a:xfrm>
+        </p:spPr>
+        <p:txBody>
+          <a:bodyPr/>
+          <a:lstStyle/>
+          <a:p>
+            <a:r>
+              <a:rPr lang="en-US" dirty="0"/>
+              <a:t>Range:</a:t>
+            </a:r>
+          </a:p>
+          <a:p>
+            <a:pPr lvl="1"/>
+            <a:r>
+              <a:rPr lang="en-US" dirty="0"/>
+              <a:t>0 – Identical structures</a:t>
+            </a:r>
+          </a:p>
+          <a:p>
+            <a:pPr lvl="1"/>
+            <a:r>
+              <a:rPr lang="en-US" dirty="0"/>
+              <a:t>2n – 6 – maximally different trees</a:t>
+            </a:r>
+          </a:p>
+          <a:p>
+            <a:pPr lvl="2"/>
             <a:r>
               <a:rPr lang="en-US" dirty="0">
                 <a:solidFill>
                   <a:srgbClr val="FF0000"/>
                 </a:solidFill>
               </a:rPr>
-              <a:t>EXAMPLE! (build)</a:t>
-            </a:r>
-          </a:p>
-          <a:p>
-            <a:pPr lvl="1"/>
+              <a:t>N – 3 internal edges</a:t>
+            </a:r>
+          </a:p>
+          <a:p>
+            <a:pPr marL="0" indent="0">
+              <a:buNone/>
+            </a:pPr>
             <a:r>
               <a:rPr lang="en-US" dirty="0">
                 <a:solidFill>
                   <a:srgbClr val="FF0000"/>
                 </a:solidFill>
               </a:rPr>
-              <a:t>Large-tree </a:t>
-            </a:r>
-            <a:r>
-              <a:rPr lang="en-US" dirty="0">
+              <a:t> - importance of difference in </a:t>
+            </a:r>
+            <a:r>
+              <a:rPr lang="en-US" dirty="0" err="1">
                 <a:solidFill>
                   <a:srgbClr val="FF0000"/>
                 </a:solidFill>
-                <a:sym typeface="Wingdings" panose="05000000000000000000" pitchFamily="2" charset="2"/>
-              </a:rPr>
-              <a:t> induced tree highlighted  induced tree refined and extracted</a:t>
+              </a:rPr>
+              <a:t>biparititons</a:t>
             </a:r>
             <a:endParaRPr lang="en-US" dirty="0">
               <a:solidFill>
@@ -5571,31 +5567,12 @@
             </a:endParaRPr>
           </a:p>
           <a:p>
-            <a:endParaRPr lang="en-US" dirty="0"/>
-          </a:p>
-          <a:p>
-            <a:endParaRPr lang="en-US" dirty="0"/>
-          </a:p>
-          <a:p>
-            <a:endParaRPr lang="en-US" dirty="0"/>
-          </a:p>
-          <a:p>
-            <a:endParaRPr lang="en-US" dirty="0"/>
-          </a:p>
-          <a:p>
-            <a:endParaRPr lang="en-US" dirty="0"/>
-          </a:p>
-          <a:p>
+            <a:pPr marL="0" indent="0">
+              <a:buNone/>
+            </a:pPr>
             <a:r>
               <a:rPr lang="en-US" dirty="0"/>
-              <a:t>Homeomorphic subtree of T induced by X</a:t>
-            </a:r>
-          </a:p>
-          <a:p>
-            <a:pPr lvl="1"/>
-            <a:r>
-              <a:rPr lang="en-US" dirty="0"/>
-              <a:t>AKA: T|X</a:t>
+              <a:t>(fitting into biological standard ) proof of concept</a:t>
             </a:r>
           </a:p>
         </p:txBody>
@@ -5603,7 +5580,7 @@
     </p:spTree>
     <p:extLst>
       <p:ext uri="{BB962C8B-B14F-4D97-AF65-F5344CB8AC3E}">
-        <p14:creationId xmlns:p14="http://schemas.microsoft.com/office/powerpoint/2010/main" val="164477223"/>
+        <p14:creationId xmlns:p14="http://schemas.microsoft.com/office/powerpoint/2010/main" val="3323507255"/>
       </p:ext>
     </p:extLst>
   </p:cSld>
@@ -5635,7 +5612,7 @@
           <p:cNvPr id="2" name="Title 1">
             <a:extLst>
               <a:ext uri="{FF2B5EF4-FFF2-40B4-BE49-F238E27FC236}">
-                <a16:creationId xmlns:a16="http://schemas.microsoft.com/office/drawing/2014/main" id="{1DA41681-B73B-4C7B-9403-9B676704E574}"/>
+                <a16:creationId xmlns:a16="http://schemas.microsoft.com/office/drawing/2014/main" id="{04A1F292-AFDD-4FB5-A3BC-97CA483E0F6C}"/>
               </a:ext>
             </a:extLst>
           </p:cNvPr>
@@ -5653,7 +5630,7 @@
           <a:p>
             <a:r>
               <a:rPr lang="en-US" dirty="0"/>
-              <a:t>Compatibility</a:t>
+              <a:t>Homeomorphic Subtrees</a:t>
             </a:r>
           </a:p>
         </p:txBody>
@@ -5663,7 +5640,7 @@
           <p:cNvPr id="3" name="Content Placeholder 2">
             <a:extLst>
               <a:ext uri="{FF2B5EF4-FFF2-40B4-BE49-F238E27FC236}">
-                <a16:creationId xmlns:a16="http://schemas.microsoft.com/office/drawing/2014/main" id="{677896E2-6BA8-4B78-B2F2-48B1F155C856}"/>
+                <a16:creationId xmlns:a16="http://schemas.microsoft.com/office/drawing/2014/main" id="{22436093-9924-4B60-8213-D05CA4A64296}"/>
               </a:ext>
             </a:extLst>
           </p:cNvPr>
@@ -5677,186 +5654,78 @@
         <p:spPr/>
         <p:txBody>
           <a:bodyPr>
-            <a:normAutofit fontScale="92500" lnSpcReduction="10000"/>
+            <a:normAutofit lnSpcReduction="10000"/>
           </a:bodyPr>
           <a:lstStyle/>
           <a:p>
             <a:r>
-              <a:rPr lang="en-US" dirty="0"/>
-              <a:t>Identical trees / Total tree count</a:t>
-            </a:r>
-          </a:p>
-          <a:p>
-            <a:endParaRPr lang="en-US" dirty="0"/>
-          </a:p>
-          <a:p>
-            <a:r>
               <a:rPr lang="en-US" dirty="0">
                 <a:solidFill>
                   <a:srgbClr val="FF0000"/>
                 </a:solidFill>
+              </a:rPr>
+              <a:t>EXAMPLE! (build)</a:t>
+            </a:r>
+          </a:p>
+          <a:p>
+            <a:pPr lvl="1"/>
+            <a:r>
+              <a:rPr lang="en-US" dirty="0">
+                <a:solidFill>
+                  <a:srgbClr val="FF0000"/>
+                </a:solidFill>
+              </a:rPr>
+              <a:t>Large-tree </a:t>
+            </a:r>
+            <a:r>
+              <a:rPr lang="en-US" dirty="0">
+                <a:solidFill>
+                  <a:srgbClr val="FF0000"/>
+                </a:solidFill>
                 <a:sym typeface="Wingdings" panose="05000000000000000000" pitchFamily="2" charset="2"/>
               </a:rPr>
-              <a:t>Quartet compatibility – induced quartets compared to directly generated quartets</a:t>
-            </a:r>
-          </a:p>
-          <a:p>
-            <a:pPr lvl="1"/>
-            <a:r>
-              <a:rPr lang="en-US" dirty="0">
-                <a:solidFill>
-                  <a:srgbClr val="FF0000"/>
-                </a:solidFill>
-                <a:sym typeface="Wingdings" panose="05000000000000000000" pitchFamily="2" charset="2"/>
-              </a:rPr>
-              <a:t>(p. 91) St. John et al (2003) proved induced quartets from NJ more </a:t>
-            </a:r>
-            <a:r>
-              <a:rPr lang="en-US" dirty="0" err="1">
-                <a:solidFill>
-                  <a:srgbClr val="FF0000"/>
-                </a:solidFill>
-                <a:sym typeface="Wingdings" panose="05000000000000000000" pitchFamily="2" charset="2"/>
-              </a:rPr>
-              <a:t>accuarete</a:t>
-            </a:r>
-            <a:r>
-              <a:rPr lang="en-US" dirty="0">
-                <a:solidFill>
-                  <a:srgbClr val="FF0000"/>
-                </a:solidFill>
-                <a:sym typeface="Wingdings" panose="05000000000000000000" pitchFamily="2" charset="2"/>
-              </a:rPr>
-              <a:t> than directly generated Quartets from FPM</a:t>
-            </a:r>
-          </a:p>
-          <a:p>
+              <a:t> induced tree highlighted  induced tree refined and extracted</a:t>
+            </a:r>
             <a:endParaRPr lang="en-US" dirty="0">
               <a:solidFill>
                 <a:srgbClr val="FF0000"/>
               </a:solidFill>
-              <a:sym typeface="Wingdings" panose="05000000000000000000" pitchFamily="2" charset="2"/>
             </a:endParaRPr>
           </a:p>
           <a:p>
-            <a:r>
-              <a:rPr lang="en-US" dirty="0">
-                <a:solidFill>
-                  <a:srgbClr val="FF0000"/>
-                </a:solidFill>
-                <a:sym typeface="Wingdings" panose="05000000000000000000" pitchFamily="2" charset="2"/>
-              </a:rPr>
-              <a:t>T &amp; t</a:t>
+            <a:endParaRPr lang="en-US" dirty="0"/>
+          </a:p>
+          <a:p>
+            <a:endParaRPr lang="en-US" dirty="0"/>
+          </a:p>
+          <a:p>
+            <a:endParaRPr lang="en-US" dirty="0"/>
+          </a:p>
+          <a:p>
+            <a:endParaRPr lang="en-US" dirty="0"/>
+          </a:p>
+          <a:p>
+            <a:endParaRPr lang="en-US" dirty="0"/>
+          </a:p>
+          <a:p>
+            <a:r>
+              <a:rPr lang="en-US" dirty="0"/>
+              <a:t>Homeomorphic subtree of T induced by X</a:t>
             </a:r>
           </a:p>
           <a:p>
             <a:pPr lvl="1"/>
             <a:r>
-              <a:rPr lang="en-US" dirty="0">
-                <a:solidFill>
-                  <a:srgbClr val="FF0000"/>
-                </a:solidFill>
-                <a:sym typeface="Wingdings" panose="05000000000000000000" pitchFamily="2" charset="2"/>
-              </a:rPr>
-              <a:t>If T|X is refinement of t ( i.e. C(T|X) contains all bipartitions of C(t) )</a:t>
-            </a:r>
-          </a:p>
-          <a:p>
-            <a:pPr lvl="2"/>
-            <a:r>
-              <a:rPr lang="en-US" dirty="0">
-                <a:solidFill>
-                  <a:srgbClr val="FF0000"/>
-                </a:solidFill>
-                <a:sym typeface="Wingdings" panose="05000000000000000000" pitchFamily="2" charset="2"/>
-              </a:rPr>
-              <a:t>NOTE: C(T|X) may have additional </a:t>
-            </a:r>
-            <a:r>
-              <a:rPr lang="en-US" dirty="0" err="1">
-                <a:solidFill>
-                  <a:srgbClr val="FF0000"/>
-                </a:solidFill>
-                <a:sym typeface="Wingdings" panose="05000000000000000000" pitchFamily="2" charset="2"/>
-              </a:rPr>
-              <a:t>bipparitions</a:t>
-            </a:r>
-            <a:r>
-              <a:rPr lang="en-US" dirty="0">
-                <a:solidFill>
-                  <a:srgbClr val="FF0000"/>
-                </a:solidFill>
-                <a:sym typeface="Wingdings" panose="05000000000000000000" pitchFamily="2" charset="2"/>
-              </a:rPr>
-              <a:t> (refinement)</a:t>
-            </a:r>
-          </a:p>
-          <a:p>
-            <a:pPr lvl="2"/>
-            <a:r>
-              <a:rPr lang="en-US" dirty="0">
-                <a:solidFill>
-                  <a:srgbClr val="FF0000"/>
-                </a:solidFill>
-                <a:sym typeface="Wingdings" panose="05000000000000000000" pitchFamily="2" charset="2"/>
-              </a:rPr>
-              <a:t>(p. 52)  For every tree (t-</a:t>
-            </a:r>
-            <a:r>
-              <a:rPr lang="en-US" dirty="0" err="1">
-                <a:solidFill>
-                  <a:srgbClr val="FF0000"/>
-                </a:solidFill>
-                <a:sym typeface="Wingdings" panose="05000000000000000000" pitchFamily="2" charset="2"/>
-              </a:rPr>
-              <a:t>i</a:t>
-            </a:r>
-            <a:r>
-              <a:rPr lang="en-US" dirty="0">
-                <a:solidFill>
-                  <a:srgbClr val="FF0000"/>
-                </a:solidFill>
-                <a:sym typeface="Wingdings" panose="05000000000000000000" pitchFamily="2" charset="2"/>
-              </a:rPr>
-              <a:t>) in tree set, sum of RF(</a:t>
-            </a:r>
-            <a:r>
-              <a:rPr lang="en-US" dirty="0" err="1">
-                <a:solidFill>
-                  <a:srgbClr val="FF0000"/>
-                </a:solidFill>
-                <a:sym typeface="Wingdings" panose="05000000000000000000" pitchFamily="2" charset="2"/>
-              </a:rPr>
-              <a:t>T|t-i</a:t>
-            </a:r>
-            <a:r>
-              <a:rPr lang="en-US" dirty="0">
-                <a:solidFill>
-                  <a:srgbClr val="FF0000"/>
-                </a:solidFill>
-                <a:sym typeface="Wingdings" panose="05000000000000000000" pitchFamily="2" charset="2"/>
-              </a:rPr>
-              <a:t>) == 0</a:t>
-            </a:r>
-          </a:p>
-          <a:p>
-            <a:pPr marL="0" indent="0">
-              <a:buNone/>
-            </a:pPr>
-            <a:endParaRPr lang="en-US" dirty="0"/>
-          </a:p>
-          <a:p>
-            <a:pPr marL="0" indent="0">
-              <a:buNone/>
-            </a:pPr>
-            <a:endParaRPr lang="en-US" dirty="0"/>
+              <a:rPr lang="en-US" dirty="0"/>
+              <a:t>AKA: T|X</a:t>
+            </a:r>
           </a:p>
         </p:txBody>
       </p:sp>
     </p:spTree>
     <p:extLst>
       <p:ext uri="{BB962C8B-B14F-4D97-AF65-F5344CB8AC3E}">
-        <p14:creationId xmlns:p14="http://schemas.microsoft.com/office/powerpoint/2010/main" val="79932279"/>
+        <p14:creationId xmlns:p14="http://schemas.microsoft.com/office/powerpoint/2010/main" val="164477223"/>
       </p:ext>
     </p:extLst>
   </p:cSld>
@@ -5888,7 +5757,7 @@
           <p:cNvPr id="2" name="Title 1">
             <a:extLst>
               <a:ext uri="{FF2B5EF4-FFF2-40B4-BE49-F238E27FC236}">
-                <a16:creationId xmlns:a16="http://schemas.microsoft.com/office/drawing/2014/main" id="{1F654729-F01B-4F9F-8EA4-A870B05B28CF}"/>
+                <a16:creationId xmlns:a16="http://schemas.microsoft.com/office/drawing/2014/main" id="{1DA41681-B73B-4C7B-9403-9B676704E574}"/>
               </a:ext>
             </a:extLst>
           </p:cNvPr>
@@ -5906,7 +5775,7 @@
           <a:p>
             <a:r>
               <a:rPr lang="en-US" dirty="0"/>
-              <a:t>Agreement</a:t>
+              <a:t>Compatibility</a:t>
             </a:r>
           </a:p>
         </p:txBody>
@@ -5916,7 +5785,7 @@
           <p:cNvPr id="3" name="Content Placeholder 2">
             <a:extLst>
               <a:ext uri="{FF2B5EF4-FFF2-40B4-BE49-F238E27FC236}">
-                <a16:creationId xmlns:a16="http://schemas.microsoft.com/office/drawing/2014/main" id="{41842C8C-5488-46EF-86AA-79550E6AB743}"/>
+                <a16:creationId xmlns:a16="http://schemas.microsoft.com/office/drawing/2014/main" id="{677896E2-6BA8-4B78-B2F2-48B1F155C856}"/>
               </a:ext>
             </a:extLst>
           </p:cNvPr>
@@ -5929,52 +5798,51 @@
         </p:nvSpPr>
         <p:spPr/>
         <p:txBody>
-          <a:bodyPr/>
+          <a:bodyPr>
+            <a:normAutofit fontScale="70000" lnSpcReduction="20000"/>
+          </a:bodyPr>
           <a:lstStyle/>
           <a:p>
             <a:r>
               <a:rPr lang="en-US" dirty="0"/>
-              <a:t>Q(T0) (intersection) Q(T)</a:t>
-            </a:r>
-          </a:p>
-          <a:p>
-            <a:pPr lvl="1"/>
+              <a:t>Identical trees / Total tree count</a:t>
+            </a:r>
+          </a:p>
+          <a:p>
+            <a:endParaRPr lang="en-US" dirty="0"/>
+          </a:p>
+          <a:p>
             <a:r>
               <a:rPr lang="en-US" dirty="0">
                 <a:solidFill>
                   <a:srgbClr val="FF0000"/>
                 </a:solidFill>
               </a:rPr>
-              <a:t>T0 </a:t>
-            </a:r>
-            <a:r>
-              <a:rPr lang="en-US" dirty="0">
+              <a:t>Wilson-rogers </a:t>
+            </a:r>
+            <a:r>
+              <a:rPr lang="en-US" dirty="0" err="1">
                 <a:solidFill>
                   <a:srgbClr val="FF0000"/>
                 </a:solidFill>
-                <a:sym typeface="Wingdings" panose="05000000000000000000" pitchFamily="2" charset="2"/>
-              </a:rPr>
-              <a:t> “true tree”</a:t>
-            </a:r>
-          </a:p>
-          <a:p>
-            <a:pPr lvl="1"/>
+              </a:rPr>
+              <a:t>compatability</a:t>
+            </a:r>
             <a:endParaRPr lang="en-US" dirty="0">
               <a:solidFill>
                 <a:srgbClr val="FF0000"/>
               </a:solidFill>
-              <a:sym typeface="Wingdings" panose="05000000000000000000" pitchFamily="2" charset="2"/>
             </a:endParaRPr>
           </a:p>
           <a:p>
             <a:r>
               <a:rPr lang="en-US" dirty="0">
                 <a:solidFill>
-                  <a:schemeClr val="tx1"/>
+                  <a:srgbClr val="FF0000"/>
                 </a:solidFill>
                 <a:sym typeface="Wingdings" panose="05000000000000000000" pitchFamily="2" charset="2"/>
               </a:rPr>
-              <a:t>Quartet Agreement</a:t>
+              <a:t>Quartet compatibility – induced quartets compared to directly generated quartets</a:t>
             </a:r>
           </a:p>
           <a:p>
@@ -5986,18 +5854,25 @@
                 </a:solidFill>
                 <a:sym typeface="Wingdings" panose="05000000000000000000" pitchFamily="2" charset="2"/>
               </a:rPr>
-              <a:t>Agreement between directly generated quartet trees </a:t>
-            </a:r>
-          </a:p>
-          <a:p>
+              <a:t>(p. 91) St. John et al (2003) proved induced quartets from NJ more </a:t>
+            </a:r>
+            <a:r>
+              <a:rPr lang="en-US" dirty="0" err="1">
+                <a:solidFill>
+                  <a:srgbClr val="FF0000"/>
+                </a:solidFill>
+                <a:sym typeface="Wingdings" panose="05000000000000000000" pitchFamily="2" charset="2"/>
+              </a:rPr>
+              <a:t>accuarete</a:t>
+            </a:r>
             <a:r>
               <a:rPr lang="en-US" dirty="0">
                 <a:solidFill>
-                  <a:schemeClr val="tx1"/>
+                  <a:srgbClr val="FF0000"/>
                 </a:solidFill>
                 <a:sym typeface="Wingdings" panose="05000000000000000000" pitchFamily="2" charset="2"/>
               </a:rPr>
-              <a:t>Induced Quartet Agreement</a:t>
+              <a:t> than directly generated Quartets from FPM</a:t>
             </a:r>
           </a:p>
           <a:p>
@@ -6009,42 +5884,169 @@
                 </a:solidFill>
                 <a:sym typeface="Wingdings" panose="05000000000000000000" pitchFamily="2" charset="2"/>
               </a:rPr>
-              <a:t>Agreement between induced quartet trees </a:t>
-            </a:r>
-          </a:p>
-          <a:p>
-            <a:endParaRPr lang="en-US" dirty="0">
-              <a:solidFill>
-                <a:schemeClr val="tx1"/>
-              </a:solidFill>
-              <a:sym typeface="Wingdings" panose="05000000000000000000" pitchFamily="2" charset="2"/>
-            </a:endParaRPr>
-          </a:p>
-          <a:p>
-            <a:endParaRPr lang="en-US" dirty="0">
-              <a:solidFill>
-                <a:schemeClr val="tx1"/>
-              </a:solidFill>
-              <a:sym typeface="Wingdings" panose="05000000000000000000" pitchFamily="2" charset="2"/>
-            </a:endParaRPr>
+              <a:t>WHY QUARTETS?</a:t>
+            </a:r>
+          </a:p>
+          <a:p>
+            <a:pPr lvl="2"/>
+            <a:r>
+              <a:rPr lang="en-US" dirty="0">
+                <a:solidFill>
+                  <a:srgbClr val="FF0000"/>
+                </a:solidFill>
+                <a:sym typeface="Wingdings" panose="05000000000000000000" pitchFamily="2" charset="2"/>
+              </a:rPr>
+              <a:t>Smallest unit -- Building blocks???</a:t>
+            </a:r>
+          </a:p>
+          <a:p>
+            <a:r>
+              <a:rPr lang="en-US" dirty="0">
+                <a:solidFill>
+                  <a:srgbClr val="FF0000"/>
+                </a:solidFill>
+                <a:sym typeface="Wingdings" panose="05000000000000000000" pitchFamily="2" charset="2"/>
+              </a:rPr>
+              <a:t>(behaving like </a:t>
+            </a:r>
+            <a:r>
+              <a:rPr lang="en-US" dirty="0" err="1">
+                <a:solidFill>
+                  <a:srgbClr val="FF0000"/>
+                </a:solidFill>
+                <a:sym typeface="Wingdings" panose="05000000000000000000" pitchFamily="2" charset="2"/>
+              </a:rPr>
+              <a:t>mrBayes</a:t>
+            </a:r>
+            <a:r>
+              <a:rPr lang="en-US" dirty="0">
+                <a:solidFill>
+                  <a:srgbClr val="FF0000"/>
+                </a:solidFill>
+                <a:sym typeface="Wingdings" panose="05000000000000000000" pitchFamily="2" charset="2"/>
+              </a:rPr>
+              <a:t> – proof of concept)</a:t>
+            </a:r>
+          </a:p>
+          <a:p>
+            <a:r>
+              <a:rPr lang="en-US" dirty="0">
+                <a:solidFill>
+                  <a:srgbClr val="FF0000"/>
+                </a:solidFill>
+                <a:sym typeface="Wingdings" panose="05000000000000000000" pitchFamily="2" charset="2"/>
+              </a:rPr>
+              <a:t>T &amp; t</a:t>
+            </a:r>
+          </a:p>
+          <a:p>
+            <a:pPr lvl="1"/>
+            <a:r>
+              <a:rPr lang="en-US" dirty="0">
+                <a:solidFill>
+                  <a:srgbClr val="FF0000"/>
+                </a:solidFill>
+                <a:sym typeface="Wingdings" panose="05000000000000000000" pitchFamily="2" charset="2"/>
+              </a:rPr>
+              <a:t>If T|X is refinement of t ( i.e. C(T|X) contains all bipartitions of C(t) )</a:t>
+            </a:r>
+          </a:p>
+          <a:p>
+            <a:pPr lvl="2"/>
+            <a:r>
+              <a:rPr lang="en-US" dirty="0">
+                <a:solidFill>
+                  <a:srgbClr val="FF0000"/>
+                </a:solidFill>
+                <a:sym typeface="Wingdings" panose="05000000000000000000" pitchFamily="2" charset="2"/>
+              </a:rPr>
+              <a:t>NOTE: C(T|X) may have additional </a:t>
+            </a:r>
+            <a:r>
+              <a:rPr lang="en-US" dirty="0" err="1">
+                <a:solidFill>
+                  <a:srgbClr val="FF0000"/>
+                </a:solidFill>
+                <a:sym typeface="Wingdings" panose="05000000000000000000" pitchFamily="2" charset="2"/>
+              </a:rPr>
+              <a:t>bipparitions</a:t>
+            </a:r>
+            <a:r>
+              <a:rPr lang="en-US" dirty="0">
+                <a:solidFill>
+                  <a:srgbClr val="FF0000"/>
+                </a:solidFill>
+                <a:sym typeface="Wingdings" panose="05000000000000000000" pitchFamily="2" charset="2"/>
+              </a:rPr>
+              <a:t> (refinement)</a:t>
+            </a:r>
+          </a:p>
+          <a:p>
+            <a:pPr lvl="2"/>
+            <a:r>
+              <a:rPr lang="en-US" dirty="0">
+                <a:solidFill>
+                  <a:srgbClr val="FF0000"/>
+                </a:solidFill>
+                <a:sym typeface="Wingdings" panose="05000000000000000000" pitchFamily="2" charset="2"/>
+              </a:rPr>
+              <a:t>(p. 52)  For every tree (t-</a:t>
+            </a:r>
+            <a:r>
+              <a:rPr lang="en-US" dirty="0" err="1">
+                <a:solidFill>
+                  <a:srgbClr val="FF0000"/>
+                </a:solidFill>
+                <a:sym typeface="Wingdings" panose="05000000000000000000" pitchFamily="2" charset="2"/>
+              </a:rPr>
+              <a:t>i</a:t>
+            </a:r>
+            <a:r>
+              <a:rPr lang="en-US" dirty="0">
+                <a:solidFill>
+                  <a:srgbClr val="FF0000"/>
+                </a:solidFill>
+                <a:sym typeface="Wingdings" panose="05000000000000000000" pitchFamily="2" charset="2"/>
+              </a:rPr>
+              <a:t>) in tree set, sum of RF(</a:t>
+            </a:r>
+            <a:r>
+              <a:rPr lang="en-US" dirty="0" err="1">
+                <a:solidFill>
+                  <a:srgbClr val="FF0000"/>
+                </a:solidFill>
+                <a:sym typeface="Wingdings" panose="05000000000000000000" pitchFamily="2" charset="2"/>
+              </a:rPr>
+              <a:t>T|t-i</a:t>
+            </a:r>
+            <a:r>
+              <a:rPr lang="en-US" dirty="0">
+                <a:solidFill>
+                  <a:srgbClr val="FF0000"/>
+                </a:solidFill>
+                <a:sym typeface="Wingdings" panose="05000000000000000000" pitchFamily="2" charset="2"/>
+              </a:rPr>
+              <a:t>) == 0</a:t>
+            </a:r>
           </a:p>
           <a:p>
             <a:pPr marL="0" indent="0">
               <a:buNone/>
             </a:pPr>
-            <a:endParaRPr lang="en-US" dirty="0">
-              <a:solidFill>
-                <a:srgbClr val="FF0000"/>
-              </a:solidFill>
-              <a:sym typeface="Wingdings" panose="05000000000000000000" pitchFamily="2" charset="2"/>
-            </a:endParaRPr>
+            <a:endParaRPr lang="en-US" dirty="0"/>
+          </a:p>
+          <a:p>
+            <a:pPr marL="0" indent="0">
+              <a:buNone/>
+            </a:pPr>
+            <a:endParaRPr lang="en-US" dirty="0"/>
           </a:p>
         </p:txBody>
       </p:sp>
     </p:spTree>
     <p:extLst>
       <p:ext uri="{BB962C8B-B14F-4D97-AF65-F5344CB8AC3E}">
-        <p14:creationId xmlns:p14="http://schemas.microsoft.com/office/powerpoint/2010/main" val="2890113839"/>
+        <p14:creationId xmlns:p14="http://schemas.microsoft.com/office/powerpoint/2010/main" val="79932279"/>
       </p:ext>
     </p:extLst>
   </p:cSld>
@@ -6076,7 +6078,7 @@
           <p:cNvPr id="2" name="Title 1">
             <a:extLst>
               <a:ext uri="{FF2B5EF4-FFF2-40B4-BE49-F238E27FC236}">
-                <a16:creationId xmlns:a16="http://schemas.microsoft.com/office/drawing/2014/main" id="{7C71A0DC-6AE4-4E73-BF5B-8273443BA46C}"/>
+                <a16:creationId xmlns:a16="http://schemas.microsoft.com/office/drawing/2014/main" id="{1F654729-F01B-4F9F-8EA4-A870B05B28CF}"/>
               </a:ext>
             </a:extLst>
           </p:cNvPr>
@@ -6094,7 +6096,7 @@
           <a:p>
             <a:r>
               <a:rPr lang="en-US" dirty="0"/>
-              <a:t>Results</a:t>
+              <a:t>Agreement</a:t>
             </a:r>
           </a:p>
         </p:txBody>
@@ -6104,7 +6106,7 @@
           <p:cNvPr id="3" name="Content Placeholder 2">
             <a:extLst>
               <a:ext uri="{FF2B5EF4-FFF2-40B4-BE49-F238E27FC236}">
-                <a16:creationId xmlns:a16="http://schemas.microsoft.com/office/drawing/2014/main" id="{E558FABB-F62F-4198-88B3-5DE192B19659}"/>
+                <a16:creationId xmlns:a16="http://schemas.microsoft.com/office/drawing/2014/main" id="{41842C8C-5488-46EF-86AA-79550E6AB743}"/>
               </a:ext>
             </a:extLst>
           </p:cNvPr>
@@ -6117,17 +6119,157 @@
         </p:nvSpPr>
         <p:spPr/>
         <p:txBody>
-          <a:bodyPr/>
-          <a:lstStyle/>
-          <a:p>
-            <a:endParaRPr lang="en-US"/>
+          <a:bodyPr>
+            <a:normAutofit fontScale="92500" lnSpcReduction="10000"/>
+          </a:bodyPr>
+          <a:lstStyle/>
+          <a:p>
+            <a:r>
+              <a:rPr lang="en-US" dirty="0"/>
+              <a:t>Q(T0) (intersection) Q(T)</a:t>
+            </a:r>
+          </a:p>
+          <a:p>
+            <a:pPr lvl="1"/>
+            <a:r>
+              <a:rPr lang="en-US" dirty="0">
+                <a:solidFill>
+                  <a:srgbClr val="FF0000"/>
+                </a:solidFill>
+              </a:rPr>
+              <a:t>T0 </a:t>
+            </a:r>
+            <a:r>
+              <a:rPr lang="en-US" dirty="0">
+                <a:solidFill>
+                  <a:srgbClr val="FF0000"/>
+                </a:solidFill>
+                <a:sym typeface="Wingdings" panose="05000000000000000000" pitchFamily="2" charset="2"/>
+              </a:rPr>
+              <a:t> “true tree”</a:t>
+            </a:r>
+          </a:p>
+          <a:p>
+            <a:pPr lvl="1"/>
+            <a:endParaRPr lang="en-US" dirty="0">
+              <a:solidFill>
+                <a:srgbClr val="FF0000"/>
+              </a:solidFill>
+              <a:sym typeface="Wingdings" panose="05000000000000000000" pitchFamily="2" charset="2"/>
+            </a:endParaRPr>
+          </a:p>
+          <a:p>
+            <a:r>
+              <a:rPr lang="en-US" dirty="0">
+                <a:solidFill>
+                  <a:schemeClr val="tx1"/>
+                </a:solidFill>
+                <a:sym typeface="Wingdings" panose="05000000000000000000" pitchFamily="2" charset="2"/>
+              </a:rPr>
+              <a:t>Quartet Agreement</a:t>
+            </a:r>
+          </a:p>
+          <a:p>
+            <a:pPr lvl="1"/>
+            <a:r>
+              <a:rPr lang="en-US" dirty="0">
+                <a:solidFill>
+                  <a:srgbClr val="FF0000"/>
+                </a:solidFill>
+                <a:sym typeface="Wingdings" panose="05000000000000000000" pitchFamily="2" charset="2"/>
+              </a:rPr>
+              <a:t>Agreement between directly generated quartet trees </a:t>
+            </a:r>
+          </a:p>
+          <a:p>
+            <a:r>
+              <a:rPr lang="en-US" dirty="0">
+                <a:solidFill>
+                  <a:schemeClr val="tx1"/>
+                </a:solidFill>
+                <a:sym typeface="Wingdings" panose="05000000000000000000" pitchFamily="2" charset="2"/>
+              </a:rPr>
+              <a:t>Induced Quartet Agreement</a:t>
+            </a:r>
+          </a:p>
+          <a:p>
+            <a:pPr lvl="1"/>
+            <a:r>
+              <a:rPr lang="en-US" dirty="0">
+                <a:solidFill>
+                  <a:srgbClr val="FF0000"/>
+                </a:solidFill>
+                <a:sym typeface="Wingdings" panose="05000000000000000000" pitchFamily="2" charset="2"/>
+              </a:rPr>
+              <a:t>Agreement between induced quartet trees </a:t>
+            </a:r>
+          </a:p>
+          <a:p>
+            <a:pPr lvl="1"/>
+            <a:endParaRPr lang="en-US" dirty="0">
+              <a:solidFill>
+                <a:srgbClr val="FF0000"/>
+              </a:solidFill>
+              <a:sym typeface="Wingdings" panose="05000000000000000000" pitchFamily="2" charset="2"/>
+            </a:endParaRPr>
+          </a:p>
+          <a:p>
+            <a:pPr lvl="1"/>
+            <a:r>
+              <a:rPr lang="en-US" dirty="0">
+                <a:solidFill>
+                  <a:srgbClr val="FF0000"/>
+                </a:solidFill>
+                <a:sym typeface="Wingdings" panose="05000000000000000000" pitchFamily="2" charset="2"/>
+              </a:rPr>
+              <a:t>What does this result say???</a:t>
+            </a:r>
+          </a:p>
+          <a:p>
+            <a:pPr lvl="1"/>
+            <a:r>
+              <a:rPr lang="en-US" dirty="0">
+                <a:solidFill>
+                  <a:srgbClr val="FF0000"/>
+                </a:solidFill>
+                <a:sym typeface="Wingdings" panose="05000000000000000000" pitchFamily="2" charset="2"/>
+              </a:rPr>
+              <a:t>Why quartets???</a:t>
+            </a:r>
+          </a:p>
+          <a:p>
+            <a:endParaRPr lang="en-US" dirty="0">
+              <a:solidFill>
+                <a:schemeClr val="tx1"/>
+              </a:solidFill>
+              <a:sym typeface="Wingdings" panose="05000000000000000000" pitchFamily="2" charset="2"/>
+            </a:endParaRPr>
+          </a:p>
+          <a:p>
+            <a:endParaRPr lang="en-US" dirty="0">
+              <a:solidFill>
+                <a:schemeClr val="tx1"/>
+              </a:solidFill>
+              <a:sym typeface="Wingdings" panose="05000000000000000000" pitchFamily="2" charset="2"/>
+            </a:endParaRPr>
+          </a:p>
+          <a:p>
+            <a:pPr marL="0" indent="0">
+              <a:buNone/>
+            </a:pPr>
+            <a:endParaRPr lang="en-US" dirty="0">
+              <a:solidFill>
+                <a:srgbClr val="FF0000"/>
+              </a:solidFill>
+              <a:sym typeface="Wingdings" panose="05000000000000000000" pitchFamily="2" charset="2"/>
+            </a:endParaRPr>
           </a:p>
         </p:txBody>
       </p:sp>
     </p:spTree>
     <p:extLst>
       <p:ext uri="{BB962C8B-B14F-4D97-AF65-F5344CB8AC3E}">
-        <p14:creationId xmlns:p14="http://schemas.microsoft.com/office/powerpoint/2010/main" val="1478176425"/>
+        <p14:creationId xmlns:p14="http://schemas.microsoft.com/office/powerpoint/2010/main" val="2890113839"/>
       </p:ext>
     </p:extLst>
   </p:cSld>
@@ -6159,7 +6301,7 @@
           <p:cNvPr id="2" name="Title 1">
             <a:extLst>
               <a:ext uri="{FF2B5EF4-FFF2-40B4-BE49-F238E27FC236}">
-                <a16:creationId xmlns:a16="http://schemas.microsoft.com/office/drawing/2014/main" id="{89778CF9-C0C2-4E5A-9498-8E5A3EFBEE1C}"/>
+                <a16:creationId xmlns:a16="http://schemas.microsoft.com/office/drawing/2014/main" id="{7C71A0DC-6AE4-4E73-BF5B-8273443BA46C}"/>
               </a:ext>
             </a:extLst>
           </p:cNvPr>
@@ -6177,7 +6319,7 @@
           <a:p>
             <a:r>
               <a:rPr lang="en-US" dirty="0"/>
-              <a:t>Timings</a:t>
+              <a:t>Results</a:t>
             </a:r>
           </a:p>
         </p:txBody>
@@ -6187,7 +6329,7 @@
           <p:cNvPr id="3" name="Content Placeholder 2">
             <a:extLst>
               <a:ext uri="{FF2B5EF4-FFF2-40B4-BE49-F238E27FC236}">
-                <a16:creationId xmlns:a16="http://schemas.microsoft.com/office/drawing/2014/main" id="{9C662559-6FC7-4036-9067-313195B78470}"/>
+                <a16:creationId xmlns:a16="http://schemas.microsoft.com/office/drawing/2014/main" id="{E558FABB-F62F-4198-88B3-5DE192B19659}"/>
               </a:ext>
             </a:extLst>
           </p:cNvPr>
@@ -6203,14 +6345,17 @@
           <a:bodyPr/>
           <a:lstStyle/>
           <a:p>
-            <a:endParaRPr lang="en-US"/>
+            <a:r>
+              <a:rPr lang="en-US" dirty="0"/>
+              <a:t>Pick tables that show argument</a:t>
+            </a:r>
           </a:p>
         </p:txBody>
       </p:sp>
     </p:spTree>
     <p:extLst>
       <p:ext uri="{BB962C8B-B14F-4D97-AF65-F5344CB8AC3E}">
-        <p14:creationId xmlns:p14="http://schemas.microsoft.com/office/powerpoint/2010/main" val="834576793"/>
+        <p14:creationId xmlns:p14="http://schemas.microsoft.com/office/powerpoint/2010/main" val="1478176425"/>
       </p:ext>
     </p:extLst>
   </p:cSld>
@@ -6242,7 +6387,7 @@
           <p:cNvPr id="2" name="Title 1">
             <a:extLst>
               <a:ext uri="{FF2B5EF4-FFF2-40B4-BE49-F238E27FC236}">
-                <a16:creationId xmlns:a16="http://schemas.microsoft.com/office/drawing/2014/main" id="{D03F5BF0-0AD7-4B01-BD13-01EDFD009E2E}"/>
+                <a16:creationId xmlns:a16="http://schemas.microsoft.com/office/drawing/2014/main" id="{89778CF9-C0C2-4E5A-9498-8E5A3EFBEE1C}"/>
               </a:ext>
             </a:extLst>
           </p:cNvPr>
@@ -6259,10 +6404,9 @@
           <a:lstStyle/>
           <a:p>
             <a:r>
-              <a:rPr lang="en-US" dirty="0" err="1"/>
-              <a:t>PhyloTools</a:t>
-            </a:r>
-            <a:endParaRPr lang="en-US" dirty="0"/>
+              <a:rPr lang="en-US" dirty="0"/>
+              <a:t>Timings</a:t>
+            </a:r>
           </a:p>
         </p:txBody>
       </p:sp>
@@ -6271,7 +6415,7 @@
           <p:cNvPr id="3" name="Content Placeholder 2">
             <a:extLst>
               <a:ext uri="{FF2B5EF4-FFF2-40B4-BE49-F238E27FC236}">
-                <a16:creationId xmlns:a16="http://schemas.microsoft.com/office/drawing/2014/main" id="{0967048B-71FB-4B8F-84A2-0201BFF4D0FE}"/>
+                <a16:creationId xmlns:a16="http://schemas.microsoft.com/office/drawing/2014/main" id="{9C662559-6FC7-4036-9067-313195B78470}"/>
               </a:ext>
             </a:extLst>
           </p:cNvPr>
@@ -6287,63 +6431,14 @@
           <a:bodyPr/>
           <a:lstStyle/>
           <a:p>
-            <a:r>
-              <a:rPr lang="en-US" dirty="0"/>
-              <a:t>Swiss army knife</a:t>
-            </a:r>
-          </a:p>
-          <a:p>
-            <a:pPr lvl="1"/>
-            <a:r>
-              <a:rPr lang="en-US" dirty="0"/>
-              <a:t>Input:</a:t>
-            </a:r>
-          </a:p>
-          <a:p>
-            <a:pPr lvl="2"/>
-            <a:r>
-              <a:rPr lang="en-US" dirty="0"/>
-              <a:t>FASTA sequences</a:t>
-            </a:r>
-          </a:p>
-          <a:p>
-            <a:pPr lvl="2"/>
-            <a:r>
-              <a:rPr lang="en-US" dirty="0"/>
-              <a:t>…</a:t>
-            </a:r>
-          </a:p>
-          <a:p>
-            <a:pPr lvl="1"/>
-            <a:r>
-              <a:rPr lang="en-US" dirty="0"/>
-              <a:t>Output:</a:t>
-            </a:r>
-          </a:p>
-          <a:p>
-            <a:pPr lvl="2"/>
-            <a:r>
-              <a:rPr lang="en-US" dirty="0"/>
-              <a:t>Tree analysis document</a:t>
-            </a:r>
-          </a:p>
-          <a:p>
-            <a:pPr lvl="2"/>
-            <a:r>
-              <a:rPr lang="en-US" dirty="0"/>
-              <a:t>…</a:t>
-            </a:r>
-          </a:p>
-          <a:p>
-            <a:pPr lvl="1"/>
-            <a:endParaRPr lang="en-US" dirty="0"/>
+            <a:endParaRPr lang="en-US"/>
           </a:p>
         </p:txBody>
       </p:sp>
     </p:spTree>
     <p:extLst>
       <p:ext uri="{BB962C8B-B14F-4D97-AF65-F5344CB8AC3E}">
-        <p14:creationId xmlns:p14="http://schemas.microsoft.com/office/powerpoint/2010/main" val="1581292021"/>
+        <p14:creationId xmlns:p14="http://schemas.microsoft.com/office/powerpoint/2010/main" val="834576793"/>
       </p:ext>
     </p:extLst>
   </p:cSld>
@@ -6375,7 +6470,7 @@
           <p:cNvPr id="2" name="Title 1">
             <a:extLst>
               <a:ext uri="{FF2B5EF4-FFF2-40B4-BE49-F238E27FC236}">
-                <a16:creationId xmlns:a16="http://schemas.microsoft.com/office/drawing/2014/main" id="{4F31E323-9959-48AA-B336-2E14EFCC13B7}"/>
+                <a16:creationId xmlns:a16="http://schemas.microsoft.com/office/drawing/2014/main" id="{D03F5BF0-0AD7-4B01-BD13-01EDFD009E2E}"/>
               </a:ext>
             </a:extLst>
           </p:cNvPr>
@@ -6392,9 +6487,10 @@
           <a:lstStyle/>
           <a:p>
             <a:r>
-              <a:rPr lang="en-US" dirty="0"/>
-              <a:t>Future Steps?</a:t>
-            </a:r>
+              <a:rPr lang="en-US" dirty="0" err="1"/>
+              <a:t>PhyloTools</a:t>
+            </a:r>
+            <a:endParaRPr lang="en-US" dirty="0"/>
           </a:p>
         </p:txBody>
       </p:sp>
@@ -6403,7 +6499,7 @@
           <p:cNvPr id="3" name="Content Placeholder 2">
             <a:extLst>
               <a:ext uri="{FF2B5EF4-FFF2-40B4-BE49-F238E27FC236}">
-                <a16:creationId xmlns:a16="http://schemas.microsoft.com/office/drawing/2014/main" id="{280A7F7D-7743-4CCA-AD50-1149CA40B723}"/>
+                <a16:creationId xmlns:a16="http://schemas.microsoft.com/office/drawing/2014/main" id="{0967048B-71FB-4B8F-84A2-0201BFF4D0FE}"/>
               </a:ext>
             </a:extLst>
           </p:cNvPr>
@@ -6421,29 +6517,61 @@
           <a:p>
             <a:r>
               <a:rPr lang="en-US" dirty="0"/>
-              <a:t>Exploring compression methods</a:t>
+              <a:t>Swiss army knife</a:t>
             </a:r>
           </a:p>
           <a:p>
             <a:pPr lvl="1"/>
             <a:r>
               <a:rPr lang="en-US" dirty="0"/>
-              <a:t>7zip vs. WinZip</a:t>
+              <a:t>Input:</a:t>
+            </a:r>
+          </a:p>
+          <a:p>
+            <a:pPr lvl="2"/>
+            <a:r>
+              <a:rPr lang="en-US" dirty="0"/>
+              <a:t>FASTA sequences</a:t>
+            </a:r>
+          </a:p>
+          <a:p>
+            <a:pPr lvl="2"/>
+            <a:r>
+              <a:rPr lang="en-US" dirty="0"/>
+              <a:t>…</a:t>
             </a:r>
           </a:p>
           <a:p>
             <a:pPr lvl="1"/>
             <a:r>
               <a:rPr lang="en-US" dirty="0"/>
-              <a:t>Biological assumptions in compression (MFC)</a:t>
-            </a:r>
+              <a:t>Output:</a:t>
+            </a:r>
+          </a:p>
+          <a:p>
+            <a:pPr lvl="2"/>
+            <a:r>
+              <a:rPr lang="en-US" dirty="0"/>
+              <a:t>Tree analysis document</a:t>
+            </a:r>
+          </a:p>
+          <a:p>
+            <a:pPr lvl="2"/>
+            <a:r>
+              <a:rPr lang="en-US" dirty="0"/>
+              <a:t>…</a:t>
+            </a:r>
+          </a:p>
+          <a:p>
+            <a:pPr lvl="1"/>
+            <a:endParaRPr lang="en-US" dirty="0"/>
           </a:p>
         </p:txBody>
       </p:sp>
     </p:spTree>
     <p:extLst>
       <p:ext uri="{BB962C8B-B14F-4D97-AF65-F5344CB8AC3E}">
-        <p14:creationId xmlns:p14="http://schemas.microsoft.com/office/powerpoint/2010/main" val="1846401161"/>
+        <p14:creationId xmlns:p14="http://schemas.microsoft.com/office/powerpoint/2010/main" val="1581292021"/>
       </p:ext>
     </p:extLst>
   </p:cSld>
@@ -6779,6 +6907,106 @@
 </file>
 
 <file path=ppt/slides/slide20.xml><?xml version="1.0" encoding="utf-8"?>
+<p:sld xmlns:a="http://schemas.openxmlformats.org/drawingml/2006/main" xmlns:r="http://schemas.openxmlformats.org/officeDocument/2006/relationships" xmlns:p="http://schemas.openxmlformats.org/presentationml/2006/main">
+  <p:cSld>
+    <p:spTree>
+      <p:nvGrpSpPr>
+        <p:cNvPr id="1" name=""/>
+        <p:cNvGrpSpPr/>
+        <p:nvPr/>
+      </p:nvGrpSpPr>
+      <p:grpSpPr>
+        <a:xfrm>
+          <a:off x="0" y="0"/>
+          <a:ext cx="0" cy="0"/>
+          <a:chOff x="0" y="0"/>
+          <a:chExt cx="0" cy="0"/>
+        </a:xfrm>
+      </p:grpSpPr>
+      <p:sp>
+        <p:nvSpPr>
+          <p:cNvPr id="2" name="Title 1">
+            <a:extLst>
+              <a:ext uri="{FF2B5EF4-FFF2-40B4-BE49-F238E27FC236}">
+                <a16:creationId xmlns:a16="http://schemas.microsoft.com/office/drawing/2014/main" id="{4F31E323-9959-48AA-B336-2E14EFCC13B7}"/>
+              </a:ext>
+            </a:extLst>
+          </p:cNvPr>
+          <p:cNvSpPr>
+            <a:spLocks noGrp="1"/>
+          </p:cNvSpPr>
+          <p:nvPr>
+            <p:ph type="title"/>
+          </p:nvPr>
+        </p:nvSpPr>
+        <p:spPr/>
+        <p:txBody>
+          <a:bodyPr/>
+          <a:lstStyle/>
+          <a:p>
+            <a:r>
+              <a:rPr lang="en-US" dirty="0"/>
+              <a:t>Future Steps?</a:t>
+            </a:r>
+          </a:p>
+        </p:txBody>
+      </p:sp>
+      <p:sp>
+        <p:nvSpPr>
+          <p:cNvPr id="3" name="Content Placeholder 2">
+            <a:extLst>
+              <a:ext uri="{FF2B5EF4-FFF2-40B4-BE49-F238E27FC236}">
+                <a16:creationId xmlns:a16="http://schemas.microsoft.com/office/drawing/2014/main" id="{280A7F7D-7743-4CCA-AD50-1149CA40B723}"/>
+              </a:ext>
+            </a:extLst>
+          </p:cNvPr>
+          <p:cNvSpPr>
+            <a:spLocks noGrp="1"/>
+          </p:cNvSpPr>
+          <p:nvPr>
+            <p:ph idx="1"/>
+          </p:nvPr>
+        </p:nvSpPr>
+        <p:spPr/>
+        <p:txBody>
+          <a:bodyPr/>
+          <a:lstStyle/>
+          <a:p>
+            <a:r>
+              <a:rPr lang="en-US" dirty="0"/>
+              <a:t>Exploring compression methods</a:t>
+            </a:r>
+          </a:p>
+          <a:p>
+            <a:pPr lvl="1"/>
+            <a:r>
+              <a:rPr lang="en-US" dirty="0"/>
+              <a:t>7zip vs. WinZip</a:t>
+            </a:r>
+          </a:p>
+          <a:p>
+            <a:pPr lvl="1"/>
+            <a:r>
+              <a:rPr lang="en-US" dirty="0"/>
+              <a:t>Biological assumptions in compression (MFC)</a:t>
+            </a:r>
+          </a:p>
+        </p:txBody>
+      </p:sp>
+    </p:spTree>
+    <p:extLst>
+      <p:ext uri="{BB962C8B-B14F-4D97-AF65-F5344CB8AC3E}">
+        <p14:creationId xmlns:p14="http://schemas.microsoft.com/office/powerpoint/2010/main" val="1846401161"/>
+      </p:ext>
+    </p:extLst>
+  </p:cSld>
+  <p:clrMapOvr>
+    <a:masterClrMapping/>
+  </p:clrMapOvr>
+</p:sld>
+</file>
+
+<file path=ppt/slides/slide21.xml><?xml version="1.0" encoding="utf-8"?>
 <p:sld xmlns:a="http://schemas.openxmlformats.org/drawingml/2006/main" xmlns:r="http://schemas.openxmlformats.org/officeDocument/2006/relationships" xmlns:p="http://schemas.openxmlformats.org/presentationml/2006/main">
   <p:cSld>
     <p:bg>
@@ -7502,62 +7730,6 @@
             </a:r>
           </a:p>
           <a:p>
-            <a:r>
-              <a:rPr lang="en-US" dirty="0">
-                <a:solidFill>
-                  <a:schemeClr val="tx1"/>
-                </a:solidFill>
-              </a:rPr>
-              <a:t>Bells and whistles</a:t>
-            </a:r>
-          </a:p>
-          <a:p>
-            <a:pPr lvl="1"/>
-            <a:r>
-              <a:rPr lang="en-US" dirty="0">
-                <a:solidFill>
-                  <a:schemeClr val="tx1"/>
-                </a:solidFill>
-              </a:rPr>
-              <a:t>Parameters of </a:t>
-            </a:r>
-            <a:r>
-              <a:rPr lang="en-US" dirty="0" err="1">
-                <a:solidFill>
-                  <a:schemeClr val="tx1"/>
-                </a:solidFill>
-              </a:rPr>
-              <a:t>MrBayes</a:t>
-            </a:r>
-            <a:endParaRPr lang="en-US" dirty="0">
-              <a:solidFill>
-                <a:schemeClr val="tx1"/>
-              </a:solidFill>
-            </a:endParaRPr>
-          </a:p>
-          <a:p>
-            <a:pPr lvl="2"/>
-            <a:r>
-              <a:rPr lang="en-US" dirty="0">
-                <a:solidFill>
-                  <a:srgbClr val="FF0000"/>
-                </a:solidFill>
-              </a:rPr>
-              <a:t>Substitution rates</a:t>
-            </a:r>
-          </a:p>
-          <a:p>
-            <a:pPr lvl="1"/>
-            <a:r>
-              <a:rPr lang="en-US" dirty="0">
-                <a:solidFill>
-                  <a:srgbClr val="FF0000"/>
-                </a:solidFill>
-              </a:rPr>
-              <a:t>Assumptions!</a:t>
-            </a:r>
-          </a:p>
-          <a:p>
             <a:endParaRPr lang="en-US" dirty="0">
               <a:solidFill>
                 <a:srgbClr val="FF0000"/>
@@ -7746,18 +7918,13 @@
           <a:p>
             <a:pPr lvl="1"/>
             <a:r>
-              <a:rPr lang="en-US">
+              <a:rPr lang="en-US" dirty="0">
                 <a:solidFill>
                   <a:srgbClr val="FF0000"/>
                 </a:solidFill>
               </a:rPr>
               <a:t>Muscle timings</a:t>
             </a:r>
-            <a:endParaRPr lang="en-US" dirty="0">
-              <a:solidFill>
-                <a:srgbClr val="FF0000"/>
-              </a:solidFill>
-            </a:endParaRPr>
           </a:p>
         </p:txBody>
       </p:sp>
@@ -7941,7 +8108,9 @@
         </p:nvSpPr>
         <p:spPr/>
         <p:txBody>
-          <a:bodyPr/>
+          <a:bodyPr>
+            <a:normAutofit fontScale="55000" lnSpcReduction="20000"/>
+          </a:bodyPr>
           <a:lstStyle/>
           <a:p>
             <a:pPr lvl="1">
@@ -7986,6 +8155,294 @@
               <a:rPr lang="en-US" dirty="0"/>
               <a:t>Induced Quartet Agreement</a:t>
             </a:r>
+          </a:p>
+          <a:p>
+            <a:pPr lvl="1">
+              <a:lnSpc>
+                <a:spcPct val="101000"/>
+              </a:lnSpc>
+            </a:pPr>
+            <a:endParaRPr lang="en-US" dirty="0"/>
+          </a:p>
+          <a:p>
+            <a:pPr lvl="1">
+              <a:lnSpc>
+                <a:spcPct val="101000"/>
+              </a:lnSpc>
+            </a:pPr>
+            <a:r>
+              <a:rPr lang="en-US" dirty="0">
+                <a:solidFill>
+                  <a:srgbClr val="7030A0"/>
+                </a:solidFill>
+              </a:rPr>
+              <a:t>Quartet Compatibility</a:t>
+            </a:r>
+          </a:p>
+          <a:p>
+            <a:pPr lvl="2">
+              <a:lnSpc>
+                <a:spcPct val="101000"/>
+              </a:lnSpc>
+            </a:pPr>
+            <a:r>
+              <a:rPr lang="en-US" dirty="0">
+                <a:solidFill>
+                  <a:srgbClr val="7030A0"/>
+                </a:solidFill>
+              </a:rPr>
+              <a:t>Sum of RF distance for each pairing</a:t>
+            </a:r>
+          </a:p>
+          <a:p>
+            <a:pPr lvl="3">
+              <a:lnSpc>
+                <a:spcPct val="101000"/>
+              </a:lnSpc>
+            </a:pPr>
+            <a:r>
+              <a:rPr lang="en-US" dirty="0" err="1">
+                <a:solidFill>
+                  <a:srgbClr val="7030A0"/>
+                </a:solidFill>
+              </a:rPr>
+              <a:t>LargeTree</a:t>
+            </a:r>
+            <a:r>
+              <a:rPr lang="en-US" dirty="0">
+                <a:solidFill>
+                  <a:srgbClr val="7030A0"/>
+                </a:solidFill>
+              </a:rPr>
+              <a:t> </a:t>
+            </a:r>
+            <a:r>
+              <a:rPr lang="en-US" dirty="0">
+                <a:solidFill>
+                  <a:srgbClr val="7030A0"/>
+                </a:solidFill>
+                <a:sym typeface="Wingdings" panose="05000000000000000000" pitchFamily="2" charset="2"/>
+              </a:rPr>
+              <a:t> </a:t>
+            </a:r>
+            <a:r>
+              <a:rPr lang="en-US" dirty="0">
+                <a:solidFill>
+                  <a:srgbClr val="7030A0"/>
+                </a:solidFill>
+              </a:rPr>
+              <a:t> </a:t>
+            </a:r>
+            <a:r>
+              <a:rPr lang="en-US" dirty="0">
+                <a:solidFill>
+                  <a:srgbClr val="7030A0"/>
+                </a:solidFill>
+                <a:sym typeface="Wingdings" panose="05000000000000000000" pitchFamily="2" charset="2"/>
+              </a:rPr>
+              <a:t></a:t>
+            </a:r>
+            <a:r>
+              <a:rPr lang="en-US" dirty="0">
+                <a:solidFill>
+                  <a:srgbClr val="7030A0"/>
+                </a:solidFill>
+              </a:rPr>
+              <a:t> </a:t>
+            </a:r>
+            <a:r>
+              <a:rPr lang="en-US" dirty="0" err="1">
+                <a:solidFill>
+                  <a:srgbClr val="7030A0"/>
+                </a:solidFill>
+              </a:rPr>
+              <a:t>LargeTree</a:t>
+            </a:r>
+            <a:endParaRPr lang="en-US" dirty="0">
+              <a:solidFill>
+                <a:srgbClr val="7030A0"/>
+              </a:solidFill>
+            </a:endParaRPr>
+          </a:p>
+          <a:p>
+            <a:pPr lvl="4">
+              <a:lnSpc>
+                <a:spcPct val="101000"/>
+              </a:lnSpc>
+            </a:pPr>
+            <a:r>
+              <a:rPr lang="en-US" dirty="0">
+                <a:solidFill>
+                  <a:srgbClr val="7030A0"/>
+                </a:solidFill>
+              </a:rPr>
+              <a:t>True distance</a:t>
+            </a:r>
+          </a:p>
+          <a:p>
+            <a:pPr lvl="3">
+              <a:lnSpc>
+                <a:spcPct val="101000"/>
+              </a:lnSpc>
+            </a:pPr>
+            <a:r>
+              <a:rPr lang="en-US" dirty="0">
+                <a:solidFill>
+                  <a:srgbClr val="7030A0"/>
+                </a:solidFill>
+              </a:rPr>
+              <a:t>Induced Quartets </a:t>
+            </a:r>
+            <a:r>
+              <a:rPr lang="en-US" dirty="0">
+                <a:solidFill>
+                  <a:srgbClr val="7030A0"/>
+                </a:solidFill>
+                <a:sym typeface="Wingdings" panose="05000000000000000000" pitchFamily="2" charset="2"/>
+              </a:rPr>
+              <a:t> Quartets</a:t>
+            </a:r>
+          </a:p>
+          <a:p>
+            <a:pPr lvl="4">
+              <a:lnSpc>
+                <a:spcPct val="101000"/>
+              </a:lnSpc>
+            </a:pPr>
+            <a:r>
+              <a:rPr lang="en-US" dirty="0">
+                <a:solidFill>
+                  <a:srgbClr val="7030A0"/>
+                </a:solidFill>
+                <a:sym typeface="Wingdings" panose="05000000000000000000" pitchFamily="2" charset="2"/>
+              </a:rPr>
+              <a:t>??? Purpose</a:t>
+            </a:r>
+          </a:p>
+          <a:p>
+            <a:pPr lvl="3">
+              <a:lnSpc>
+                <a:spcPct val="101000"/>
+              </a:lnSpc>
+            </a:pPr>
+            <a:r>
+              <a:rPr lang="en-US" dirty="0">
+                <a:solidFill>
+                  <a:srgbClr val="7030A0"/>
+                </a:solidFill>
+                <a:sym typeface="Wingdings" panose="05000000000000000000" pitchFamily="2" charset="2"/>
+              </a:rPr>
+              <a:t>Quartets  Quartets</a:t>
+            </a:r>
+          </a:p>
+          <a:p>
+            <a:pPr lvl="4">
+              <a:lnSpc>
+                <a:spcPct val="101000"/>
+              </a:lnSpc>
+            </a:pPr>
+            <a:r>
+              <a:rPr lang="en-US" dirty="0">
+                <a:solidFill>
+                  <a:srgbClr val="7030A0"/>
+                </a:solidFill>
+                <a:sym typeface="Wingdings" panose="05000000000000000000" pitchFamily="2" charset="2"/>
+              </a:rPr>
+              <a:t>??? Purpose</a:t>
+            </a:r>
+          </a:p>
+          <a:p>
+            <a:pPr lvl="4">
+              <a:lnSpc>
+                <a:spcPct val="101000"/>
+              </a:lnSpc>
+            </a:pPr>
+            <a:r>
+              <a:rPr lang="en-US" dirty="0">
+                <a:solidFill>
+                  <a:srgbClr val="7030A0"/>
+                </a:solidFill>
+                <a:sym typeface="Wingdings" panose="05000000000000000000" pitchFamily="2" charset="2"/>
+              </a:rPr>
+              <a:t>Analyzing tree on smaller scale -&gt; results</a:t>
+            </a:r>
+          </a:p>
+          <a:p>
+            <a:pPr lvl="3">
+              <a:lnSpc>
+                <a:spcPct val="101000"/>
+              </a:lnSpc>
+            </a:pPr>
+            <a:r>
+              <a:rPr lang="en-US" dirty="0">
+                <a:solidFill>
+                  <a:srgbClr val="7030A0"/>
+                </a:solidFill>
+                <a:sym typeface="Wingdings" panose="05000000000000000000" pitchFamily="2" charset="2"/>
+              </a:rPr>
+              <a:t>Induced Quartets  Induced Quartet </a:t>
+            </a:r>
+          </a:p>
+          <a:p>
+            <a:pPr lvl="4">
+              <a:lnSpc>
+                <a:spcPct val="101000"/>
+              </a:lnSpc>
+            </a:pPr>
+            <a:r>
+              <a:rPr lang="en-US" dirty="0">
+                <a:solidFill>
+                  <a:srgbClr val="7030A0"/>
+                </a:solidFill>
+                <a:sym typeface="Wingdings" panose="05000000000000000000" pitchFamily="2" charset="2"/>
+              </a:rPr>
+              <a:t>Should be similar (identical relations?) results to </a:t>
+            </a:r>
+            <a:r>
+              <a:rPr lang="en-US" dirty="0" err="1">
+                <a:solidFill>
+                  <a:srgbClr val="7030A0"/>
+                </a:solidFill>
+                <a:sym typeface="Wingdings" panose="05000000000000000000" pitchFamily="2" charset="2"/>
+              </a:rPr>
+              <a:t>largetree</a:t>
+            </a:r>
+            <a:r>
+              <a:rPr lang="en-US" dirty="0">
+                <a:solidFill>
+                  <a:srgbClr val="7030A0"/>
+                </a:solidFill>
+                <a:sym typeface="Wingdings" panose="05000000000000000000" pitchFamily="2" charset="2"/>
+              </a:rPr>
+              <a:t>  </a:t>
+            </a:r>
+            <a:r>
+              <a:rPr lang="en-US" dirty="0" err="1">
+                <a:solidFill>
+                  <a:srgbClr val="7030A0"/>
+                </a:solidFill>
+                <a:sym typeface="Wingdings" panose="05000000000000000000" pitchFamily="2" charset="2"/>
+              </a:rPr>
+              <a:t>largetree</a:t>
+            </a:r>
+            <a:endParaRPr lang="en-US" dirty="0">
+              <a:solidFill>
+                <a:srgbClr val="7030A0"/>
+              </a:solidFill>
+              <a:sym typeface="Wingdings" panose="05000000000000000000" pitchFamily="2" charset="2"/>
+            </a:endParaRPr>
+          </a:p>
+          <a:p>
+            <a:pPr lvl="3">
+              <a:lnSpc>
+                <a:spcPct val="101000"/>
+              </a:lnSpc>
+            </a:pPr>
+            <a:endParaRPr lang="en-US" dirty="0">
+              <a:solidFill>
+                <a:srgbClr val="7030A0"/>
+              </a:solidFill>
+            </a:endParaRPr>
           </a:p>
           <a:p>
             <a:endParaRPr lang="en-US" dirty="0"/>
@@ -8027,7 +8484,7 @@
           <p:cNvPr id="2" name="Title 1">
             <a:extLst>
               <a:ext uri="{FF2B5EF4-FFF2-40B4-BE49-F238E27FC236}">
-                <a16:creationId xmlns:a16="http://schemas.microsoft.com/office/drawing/2014/main" id="{2107398C-C9F6-4BFE-BAE5-B39B1BD7F361}"/>
+                <a16:creationId xmlns:a16="http://schemas.microsoft.com/office/drawing/2014/main" id="{771A3C2B-D06F-4627-BE8A-A9208E64726A}"/>
               </a:ext>
             </a:extLst>
           </p:cNvPr>
@@ -8045,7 +8502,7 @@
           <a:p>
             <a:r>
               <a:rPr lang="en-US" dirty="0"/>
-              <a:t>Bipartition</a:t>
+              <a:t>Simulations</a:t>
             </a:r>
           </a:p>
         </p:txBody>
@@ -8055,7 +8512,7 @@
           <p:cNvPr id="3" name="Content Placeholder 2">
             <a:extLst>
               <a:ext uri="{FF2B5EF4-FFF2-40B4-BE49-F238E27FC236}">
-                <a16:creationId xmlns:a16="http://schemas.microsoft.com/office/drawing/2014/main" id="{2E61FCCF-ADB1-4D16-9FE9-A6754EAC0ACF}"/>
+                <a16:creationId xmlns:a16="http://schemas.microsoft.com/office/drawing/2014/main" id="{75F8180F-83FB-4460-B63E-B9BF95996242}"/>
               </a:ext>
             </a:extLst>
           </p:cNvPr>
@@ -8072,12 +8529,8 @@
           <a:lstStyle/>
           <a:p>
             <a:r>
-              <a:rPr lang="en-US" dirty="0">
-                <a:solidFill>
-                  <a:srgbClr val="FF0000"/>
-                </a:solidFill>
-              </a:rPr>
-              <a:t>Tree diagram (build – slide_1)</a:t>
+              <a:rPr lang="en-US" dirty="0"/>
+              <a:t>True tree</a:t>
             </a:r>
           </a:p>
         </p:txBody>
@@ -8085,7 +8538,7 @@
     </p:spTree>
     <p:extLst>
       <p:ext uri="{BB962C8B-B14F-4D97-AF65-F5344CB8AC3E}">
-        <p14:creationId xmlns:p14="http://schemas.microsoft.com/office/powerpoint/2010/main" val="3437789769"/>
+        <p14:creationId xmlns:p14="http://schemas.microsoft.com/office/powerpoint/2010/main" val="4232178544"/>
       </p:ext>
     </p:extLst>
   </p:cSld>

</xml_diff>